<commit_message>
Test on different thresholds
Test some trained model on 0.6 and 0.8 threshold
</commit_message>
<xml_diff>
--- a/worklog/worklog1.pptx
+++ b/worklog/worklog1.pptx
@@ -18,10 +18,20 @@
     <p:sldId id="269" r:id="rId12"/>
     <p:sldId id="270" r:id="rId13"/>
     <p:sldId id="272" r:id="rId14"/>
-    <p:sldId id="261" r:id="rId15"/>
-    <p:sldId id="262" r:id="rId16"/>
-    <p:sldId id="263" r:id="rId17"/>
-    <p:sldId id="267" r:id="rId18"/>
+    <p:sldId id="273" r:id="rId15"/>
+    <p:sldId id="276" r:id="rId16"/>
+    <p:sldId id="278" r:id="rId17"/>
+    <p:sldId id="277" r:id="rId18"/>
+    <p:sldId id="279" r:id="rId19"/>
+    <p:sldId id="274" r:id="rId20"/>
+    <p:sldId id="280" r:id="rId21"/>
+    <p:sldId id="275" r:id="rId22"/>
+    <p:sldId id="281" r:id="rId23"/>
+    <p:sldId id="282" r:id="rId24"/>
+    <p:sldId id="261" r:id="rId25"/>
+    <p:sldId id="262" r:id="rId26"/>
+    <p:sldId id="263" r:id="rId27"/>
+    <p:sldId id="267" r:id="rId28"/>
   </p:sldIdLst>
   <p:sldSz cx="12192000" cy="6858000"/>
   <p:notesSz cx="6858000" cy="9144000"/>
@@ -18431,7 +18441,7 @@
           <a:p>
             <a:r>
               <a:rPr lang="en-US" dirty="0"/>
-              <a:t>Conclusion &amp; confusions</a:t>
+              <a:t>Summary &amp; Confusions</a:t>
             </a:r>
           </a:p>
         </p:txBody>
@@ -18519,6 +18529,2372 @@
 </file>
 
 <file path=ppt/slides/slide14.xml><?xml version="1.0" encoding="utf-8"?>
+<p:sld xmlns:a="http://schemas.openxmlformats.org/drawingml/2006/main" xmlns:r="http://schemas.openxmlformats.org/officeDocument/2006/relationships" xmlns:p="http://schemas.openxmlformats.org/presentationml/2006/main">
+  <p:cSld>
+    <p:spTree>
+      <p:nvGrpSpPr>
+        <p:cNvPr id="1" name=""/>
+        <p:cNvGrpSpPr/>
+        <p:nvPr/>
+      </p:nvGrpSpPr>
+      <p:grpSpPr>
+        <a:xfrm>
+          <a:off x="0" y="0"/>
+          <a:ext cx="0" cy="0"/>
+          <a:chOff x="0" y="0"/>
+          <a:chExt cx="0" cy="0"/>
+        </a:xfrm>
+      </p:grpSpPr>
+      <p:sp>
+        <p:nvSpPr>
+          <p:cNvPr id="2" name="Title 1">
+            <a:extLst>
+              <a:ext uri="{FF2B5EF4-FFF2-40B4-BE49-F238E27FC236}">
+                <a16:creationId xmlns:a16="http://schemas.microsoft.com/office/drawing/2014/main" id="{6DDE9788-8B56-4581-AB9F-5356F29F7504}"/>
+              </a:ext>
+            </a:extLst>
+          </p:cNvPr>
+          <p:cNvSpPr>
+            <a:spLocks noGrp="1"/>
+          </p:cNvSpPr>
+          <p:nvPr>
+            <p:ph type="title"/>
+          </p:nvPr>
+        </p:nvSpPr>
+        <p:spPr/>
+        <p:txBody>
+          <a:bodyPr/>
+          <a:lstStyle/>
+          <a:p>
+            <a:r>
+              <a:rPr lang="en-US" dirty="0"/>
+              <a:t>Week 2: Applied Recurrent Noise </a:t>
+            </a:r>
+          </a:p>
+        </p:txBody>
+      </p:sp>
+      <p:sp>
+        <p:nvSpPr>
+          <p:cNvPr id="3" name="Content Placeholder 2">
+            <a:extLst>
+              <a:ext uri="{FF2B5EF4-FFF2-40B4-BE49-F238E27FC236}">
+                <a16:creationId xmlns:a16="http://schemas.microsoft.com/office/drawing/2014/main" id="{09CC9086-3ED4-4073-AB78-407E96366524}"/>
+              </a:ext>
+            </a:extLst>
+          </p:cNvPr>
+          <p:cNvSpPr>
+            <a:spLocks noGrp="1"/>
+          </p:cNvSpPr>
+          <p:nvPr>
+            <p:ph idx="1"/>
+          </p:nvPr>
+        </p:nvSpPr>
+        <p:spPr/>
+        <p:txBody>
+          <a:bodyPr/>
+          <a:lstStyle/>
+          <a:p>
+            <a:r>
+              <a:rPr lang="en-US" dirty="0"/>
+              <a:t>Recurrent Noise: [0.5, 1, 1.5, 2, 2.2, 2.4, 2.6, 2.8, 3]</a:t>
+            </a:r>
+          </a:p>
+          <a:p>
+            <a:r>
+              <a:rPr lang="en-US" dirty="0"/>
+              <a:t>For each recurrent noise, 10 models are trained</a:t>
+            </a:r>
+          </a:p>
+          <a:p>
+            <a:r>
+              <a:rPr lang="en-US" dirty="0"/>
+              <a:t>For each trained model, decision threshold is 0.7</a:t>
+            </a:r>
+          </a:p>
+          <a:p>
+            <a:r>
+              <a:rPr lang="en-US" dirty="0"/>
+              <a:t>Test models with decision threshold of 0.6 and 0.8</a:t>
+            </a:r>
+          </a:p>
+          <a:p>
+            <a:endParaRPr lang="en-US" dirty="0"/>
+          </a:p>
+        </p:txBody>
+      </p:sp>
+    </p:spTree>
+    <p:extLst>
+      <p:ext uri="{BB962C8B-B14F-4D97-AF65-F5344CB8AC3E}">
+        <p14:creationId xmlns:p14="http://schemas.microsoft.com/office/powerpoint/2010/main" val="3597852600"/>
+      </p:ext>
+    </p:extLst>
+  </p:cSld>
+  <p:clrMapOvr>
+    <a:masterClrMapping/>
+  </p:clrMapOvr>
+</p:sld>
+</file>
+
+<file path=ppt/slides/slide15.xml><?xml version="1.0" encoding="utf-8"?>
+<p:sld xmlns:a="http://schemas.openxmlformats.org/drawingml/2006/main" xmlns:r="http://schemas.openxmlformats.org/officeDocument/2006/relationships" xmlns:p="http://schemas.openxmlformats.org/presentationml/2006/main">
+  <p:cSld>
+    <p:spTree>
+      <p:nvGrpSpPr>
+        <p:cNvPr id="1" name=""/>
+        <p:cNvGrpSpPr/>
+        <p:nvPr/>
+      </p:nvGrpSpPr>
+      <p:grpSpPr>
+        <a:xfrm>
+          <a:off x="0" y="0"/>
+          <a:ext cx="0" cy="0"/>
+          <a:chOff x="0" y="0"/>
+          <a:chExt cx="0" cy="0"/>
+        </a:xfrm>
+      </p:grpSpPr>
+      <p:sp>
+        <p:nvSpPr>
+          <p:cNvPr id="2" name="Title 1">
+            <a:extLst>
+              <a:ext uri="{FF2B5EF4-FFF2-40B4-BE49-F238E27FC236}">
+                <a16:creationId xmlns:a16="http://schemas.microsoft.com/office/drawing/2014/main" id="{7F644D1A-0950-40F1-A893-C3253F1D62CD}"/>
+              </a:ext>
+            </a:extLst>
+          </p:cNvPr>
+          <p:cNvSpPr>
+            <a:spLocks noGrp="1"/>
+          </p:cNvSpPr>
+          <p:nvPr>
+            <p:ph type="title"/>
+          </p:nvPr>
+        </p:nvSpPr>
+        <p:spPr/>
+        <p:txBody>
+          <a:bodyPr/>
+          <a:lstStyle/>
+          <a:p>
+            <a:r>
+              <a:rPr lang="en-US" dirty="0"/>
+              <a:t>Trained rec_noise0.5; threshold 0.7; round 4</a:t>
+            </a:r>
+          </a:p>
+        </p:txBody>
+      </p:sp>
+      <p:pic>
+        <p:nvPicPr>
+          <p:cNvPr id="4" name="Picture 3" descr="A picture containing shape&#10;&#10;Description automatically generated">
+            <a:extLst>
+              <a:ext uri="{FF2B5EF4-FFF2-40B4-BE49-F238E27FC236}">
+                <a16:creationId xmlns:a16="http://schemas.microsoft.com/office/drawing/2014/main" id="{36E23DFD-DFF3-4C45-B3E4-99FC3E842033}"/>
+              </a:ext>
+            </a:extLst>
+          </p:cNvPr>
+          <p:cNvPicPr>
+            <a:picLocks noChangeAspect="1"/>
+          </p:cNvPicPr>
+          <p:nvPr/>
+        </p:nvPicPr>
+        <p:blipFill>
+          <a:blip r:embed="rId2">
+            <a:extLst>
+              <a:ext uri="{28A0092B-C50C-407E-A947-70E740481C1C}">
+                <a14:useLocalDpi xmlns:a14="http://schemas.microsoft.com/office/drawing/2010/main" val="0"/>
+              </a:ext>
+            </a:extLst>
+          </a:blip>
+          <a:stretch>
+            <a:fillRect/>
+          </a:stretch>
+        </p:blipFill>
+        <p:spPr>
+          <a:xfrm>
+            <a:off x="153143" y="1143286"/>
+            <a:ext cx="11885714" cy="4571428"/>
+          </a:xfrm>
+          <a:prstGeom prst="rect">
+            <a:avLst/>
+          </a:prstGeom>
+        </p:spPr>
+      </p:pic>
+    </p:spTree>
+    <p:extLst>
+      <p:ext uri="{BB962C8B-B14F-4D97-AF65-F5344CB8AC3E}">
+        <p14:creationId xmlns:p14="http://schemas.microsoft.com/office/powerpoint/2010/main" val="131949280"/>
+      </p:ext>
+    </p:extLst>
+  </p:cSld>
+  <p:clrMapOvr>
+    <a:masterClrMapping/>
+  </p:clrMapOvr>
+</p:sld>
+</file>
+
+<file path=ppt/slides/slide16.xml><?xml version="1.0" encoding="utf-8"?>
+<p:sld xmlns:a="http://schemas.openxmlformats.org/drawingml/2006/main" xmlns:r="http://schemas.openxmlformats.org/officeDocument/2006/relationships" xmlns:p="http://schemas.openxmlformats.org/presentationml/2006/main">
+  <p:cSld>
+    <p:spTree>
+      <p:nvGrpSpPr>
+        <p:cNvPr id="1" name=""/>
+        <p:cNvGrpSpPr/>
+        <p:nvPr/>
+      </p:nvGrpSpPr>
+      <p:grpSpPr>
+        <a:xfrm>
+          <a:off x="0" y="0"/>
+          <a:ext cx="0" cy="0"/>
+          <a:chOff x="0" y="0"/>
+          <a:chExt cx="0" cy="0"/>
+        </a:xfrm>
+      </p:grpSpPr>
+      <p:sp>
+        <p:nvSpPr>
+          <p:cNvPr id="2" name="Title 1">
+            <a:extLst>
+              <a:ext uri="{FF2B5EF4-FFF2-40B4-BE49-F238E27FC236}">
+                <a16:creationId xmlns:a16="http://schemas.microsoft.com/office/drawing/2014/main" id="{2F1F5B14-A68B-43ED-937B-871E2D739841}"/>
+              </a:ext>
+            </a:extLst>
+          </p:cNvPr>
+          <p:cNvSpPr>
+            <a:spLocks noGrp="1"/>
+          </p:cNvSpPr>
+          <p:nvPr>
+            <p:ph type="title"/>
+          </p:nvPr>
+        </p:nvSpPr>
+        <p:spPr/>
+        <p:txBody>
+          <a:bodyPr/>
+          <a:lstStyle/>
+          <a:p>
+            <a:r>
+              <a:rPr lang="en-US" dirty="0"/>
+              <a:t>Trained rec_noise0.5; threshold 0.6 VS 0.8; round 4</a:t>
+            </a:r>
+          </a:p>
+        </p:txBody>
+      </p:sp>
+      <p:pic>
+        <p:nvPicPr>
+          <p:cNvPr id="9" name="Picture 8" descr="A picture containing shape&#10;&#10;Description automatically generated">
+            <a:extLst>
+              <a:ext uri="{FF2B5EF4-FFF2-40B4-BE49-F238E27FC236}">
+                <a16:creationId xmlns:a16="http://schemas.microsoft.com/office/drawing/2014/main" id="{C40169BE-A2AF-4633-A112-A2D277921823}"/>
+              </a:ext>
+            </a:extLst>
+          </p:cNvPr>
+          <p:cNvPicPr>
+            <a:picLocks noChangeAspect="1"/>
+          </p:cNvPicPr>
+          <p:nvPr/>
+        </p:nvPicPr>
+        <p:blipFill>
+          <a:blip r:embed="rId2">
+            <a:extLst>
+              <a:ext uri="{28A0092B-C50C-407E-A947-70E740481C1C}">
+                <a14:useLocalDpi xmlns:a14="http://schemas.microsoft.com/office/drawing/2010/main" val="0"/>
+              </a:ext>
+            </a:extLst>
+          </a:blip>
+          <a:stretch>
+            <a:fillRect/>
+          </a:stretch>
+        </p:blipFill>
+        <p:spPr>
+          <a:xfrm>
+            <a:off x="1582449" y="1169919"/>
+            <a:ext cx="7315200" cy="2813538"/>
+          </a:xfrm>
+          <a:prstGeom prst="rect">
+            <a:avLst/>
+          </a:prstGeom>
+        </p:spPr>
+      </p:pic>
+      <p:pic>
+        <p:nvPicPr>
+          <p:cNvPr id="11" name="Picture 10" descr="Chart, line chart&#10;&#10;Description automatically generated">
+            <a:extLst>
+              <a:ext uri="{FF2B5EF4-FFF2-40B4-BE49-F238E27FC236}">
+                <a16:creationId xmlns:a16="http://schemas.microsoft.com/office/drawing/2014/main" id="{80D75BE9-1363-4CB5-AD9F-2A0943476747}"/>
+              </a:ext>
+            </a:extLst>
+          </p:cNvPr>
+          <p:cNvPicPr>
+            <a:picLocks noChangeAspect="1"/>
+          </p:cNvPicPr>
+          <p:nvPr/>
+        </p:nvPicPr>
+        <p:blipFill>
+          <a:blip r:embed="rId3">
+            <a:extLst>
+              <a:ext uri="{28A0092B-C50C-407E-A947-70E740481C1C}">
+                <a14:useLocalDpi xmlns:a14="http://schemas.microsoft.com/office/drawing/2010/main" val="0"/>
+              </a:ext>
+            </a:extLst>
+          </a:blip>
+          <a:stretch>
+            <a:fillRect/>
+          </a:stretch>
+        </p:blipFill>
+        <p:spPr>
+          <a:xfrm>
+            <a:off x="1582449" y="3700055"/>
+            <a:ext cx="7315200" cy="2813538"/>
+          </a:xfrm>
+          <a:prstGeom prst="rect">
+            <a:avLst/>
+          </a:prstGeom>
+        </p:spPr>
+      </p:pic>
+      <p:sp>
+        <p:nvSpPr>
+          <p:cNvPr id="12" name="TextBox 11">
+            <a:extLst>
+              <a:ext uri="{FF2B5EF4-FFF2-40B4-BE49-F238E27FC236}">
+                <a16:creationId xmlns:a16="http://schemas.microsoft.com/office/drawing/2014/main" id="{91BC34EB-FFF7-45AD-A59D-B93985358C01}"/>
+              </a:ext>
+            </a:extLst>
+          </p:cNvPr>
+          <p:cNvSpPr txBox="1"/>
+          <p:nvPr/>
+        </p:nvSpPr>
+        <p:spPr>
+          <a:xfrm>
+            <a:off x="8495930" y="2112885"/>
+            <a:ext cx="2467993" cy="3416320"/>
+          </a:xfrm>
+          <a:prstGeom prst="rect">
+            <a:avLst/>
+          </a:prstGeom>
+          <a:noFill/>
+        </p:spPr>
+        <p:txBody>
+          <a:bodyPr wrap="square" rtlCol="0">
+            <a:spAutoFit/>
+          </a:bodyPr>
+          <a:lstStyle/>
+          <a:p>
+            <a:r>
+              <a:rPr lang="en-US" dirty="0"/>
+              <a:t>Threshold: 0.6</a:t>
+            </a:r>
+          </a:p>
+          <a:p>
+            <a:endParaRPr lang="en-US" dirty="0"/>
+          </a:p>
+          <a:p>
+            <a:endParaRPr lang="en-US" dirty="0"/>
+          </a:p>
+          <a:p>
+            <a:endParaRPr lang="en-US" dirty="0"/>
+          </a:p>
+          <a:p>
+            <a:endParaRPr lang="en-US" dirty="0"/>
+          </a:p>
+          <a:p>
+            <a:endParaRPr lang="en-US" dirty="0"/>
+          </a:p>
+          <a:p>
+            <a:endParaRPr lang="en-US" dirty="0"/>
+          </a:p>
+          <a:p>
+            <a:endParaRPr lang="en-US" dirty="0"/>
+          </a:p>
+          <a:p>
+            <a:r>
+              <a:rPr lang="en-US" dirty="0"/>
+              <a:t>Threshold: 0.8</a:t>
+            </a:r>
+          </a:p>
+        </p:txBody>
+      </p:sp>
+    </p:spTree>
+    <p:extLst>
+      <p:ext uri="{BB962C8B-B14F-4D97-AF65-F5344CB8AC3E}">
+        <p14:creationId xmlns:p14="http://schemas.microsoft.com/office/powerpoint/2010/main" val="3823124436"/>
+      </p:ext>
+    </p:extLst>
+  </p:cSld>
+  <p:clrMapOvr>
+    <a:masterClrMapping/>
+  </p:clrMapOvr>
+</p:sld>
+</file>
+
+<file path=ppt/slides/slide17.xml><?xml version="1.0" encoding="utf-8"?>
+<p:sld xmlns:a="http://schemas.openxmlformats.org/drawingml/2006/main" xmlns:r="http://schemas.openxmlformats.org/officeDocument/2006/relationships" xmlns:p="http://schemas.openxmlformats.org/presentationml/2006/main">
+  <p:cSld>
+    <p:spTree>
+      <p:nvGrpSpPr>
+        <p:cNvPr id="1" name=""/>
+        <p:cNvGrpSpPr/>
+        <p:nvPr/>
+      </p:nvGrpSpPr>
+      <p:grpSpPr>
+        <a:xfrm>
+          <a:off x="0" y="0"/>
+          <a:ext cx="0" cy="0"/>
+          <a:chOff x="0" y="0"/>
+          <a:chExt cx="0" cy="0"/>
+        </a:xfrm>
+      </p:grpSpPr>
+      <p:sp>
+        <p:nvSpPr>
+          <p:cNvPr id="2" name="Title 1">
+            <a:extLst>
+              <a:ext uri="{FF2B5EF4-FFF2-40B4-BE49-F238E27FC236}">
+                <a16:creationId xmlns:a16="http://schemas.microsoft.com/office/drawing/2014/main" id="{7F644D1A-0950-40F1-A893-C3253F1D62CD}"/>
+              </a:ext>
+            </a:extLst>
+          </p:cNvPr>
+          <p:cNvSpPr>
+            <a:spLocks noGrp="1"/>
+          </p:cNvSpPr>
+          <p:nvPr>
+            <p:ph type="title"/>
+          </p:nvPr>
+        </p:nvSpPr>
+        <p:spPr/>
+        <p:txBody>
+          <a:bodyPr/>
+          <a:lstStyle/>
+          <a:p>
+            <a:r>
+              <a:rPr lang="en-US" dirty="0"/>
+              <a:t>Trained </a:t>
+            </a:r>
+            <a:r>
+              <a:rPr lang="en-US" dirty="0" err="1"/>
+              <a:t>rec_noise</a:t>
+            </a:r>
+            <a:r>
+              <a:rPr lang="en-US" dirty="0"/>
+              <a:t> 0.5; threshold 0.7; round 5</a:t>
+            </a:r>
+          </a:p>
+        </p:txBody>
+      </p:sp>
+      <p:pic>
+        <p:nvPicPr>
+          <p:cNvPr id="4" name="Picture 3" descr="A picture containing shape&#10;&#10;Description automatically generated">
+            <a:extLst>
+              <a:ext uri="{FF2B5EF4-FFF2-40B4-BE49-F238E27FC236}">
+                <a16:creationId xmlns:a16="http://schemas.microsoft.com/office/drawing/2014/main" id="{747462EA-7B61-4E55-93F4-8F8C37A34FA7}"/>
+              </a:ext>
+            </a:extLst>
+          </p:cNvPr>
+          <p:cNvPicPr>
+            <a:picLocks noChangeAspect="1"/>
+          </p:cNvPicPr>
+          <p:nvPr/>
+        </p:nvPicPr>
+        <p:blipFill>
+          <a:blip r:embed="rId2">
+            <a:extLst>
+              <a:ext uri="{28A0092B-C50C-407E-A947-70E740481C1C}">
+                <a14:useLocalDpi xmlns:a14="http://schemas.microsoft.com/office/drawing/2010/main" val="0"/>
+              </a:ext>
+            </a:extLst>
+          </a:blip>
+          <a:stretch>
+            <a:fillRect/>
+          </a:stretch>
+        </p:blipFill>
+        <p:spPr>
+          <a:xfrm>
+            <a:off x="153143" y="1143286"/>
+            <a:ext cx="11885714" cy="4571428"/>
+          </a:xfrm>
+          <a:prstGeom prst="rect">
+            <a:avLst/>
+          </a:prstGeom>
+        </p:spPr>
+      </p:pic>
+    </p:spTree>
+    <p:extLst>
+      <p:ext uri="{BB962C8B-B14F-4D97-AF65-F5344CB8AC3E}">
+        <p14:creationId xmlns:p14="http://schemas.microsoft.com/office/powerpoint/2010/main" val="2518478168"/>
+      </p:ext>
+    </p:extLst>
+  </p:cSld>
+  <p:clrMapOvr>
+    <a:masterClrMapping/>
+  </p:clrMapOvr>
+</p:sld>
+</file>
+
+<file path=ppt/slides/slide18.xml><?xml version="1.0" encoding="utf-8"?>
+<p:sld xmlns:a="http://schemas.openxmlformats.org/drawingml/2006/main" xmlns:r="http://schemas.openxmlformats.org/officeDocument/2006/relationships" xmlns:p="http://schemas.openxmlformats.org/presentationml/2006/main">
+  <p:cSld>
+    <p:spTree>
+      <p:nvGrpSpPr>
+        <p:cNvPr id="1" name=""/>
+        <p:cNvGrpSpPr/>
+        <p:nvPr/>
+      </p:nvGrpSpPr>
+      <p:grpSpPr>
+        <a:xfrm>
+          <a:off x="0" y="0"/>
+          <a:ext cx="0" cy="0"/>
+          <a:chOff x="0" y="0"/>
+          <a:chExt cx="0" cy="0"/>
+        </a:xfrm>
+      </p:grpSpPr>
+      <p:sp>
+        <p:nvSpPr>
+          <p:cNvPr id="2" name="Title 1">
+            <a:extLst>
+              <a:ext uri="{FF2B5EF4-FFF2-40B4-BE49-F238E27FC236}">
+                <a16:creationId xmlns:a16="http://schemas.microsoft.com/office/drawing/2014/main" id="{D3D7B1E1-ADC6-44D4-BDCE-E76561BF2440}"/>
+              </a:ext>
+            </a:extLst>
+          </p:cNvPr>
+          <p:cNvSpPr>
+            <a:spLocks noGrp="1"/>
+          </p:cNvSpPr>
+          <p:nvPr>
+            <p:ph type="title"/>
+          </p:nvPr>
+        </p:nvSpPr>
+        <p:spPr/>
+        <p:txBody>
+          <a:bodyPr/>
+          <a:lstStyle/>
+          <a:p>
+            <a:r>
+              <a:rPr lang="en-US" dirty="0"/>
+              <a:t>Trained rec_noise0.5; threshold 0.6 VS 0.8; round 5</a:t>
+            </a:r>
+          </a:p>
+        </p:txBody>
+      </p:sp>
+      <p:pic>
+        <p:nvPicPr>
+          <p:cNvPr id="5" name="Picture 4" descr="A picture containing shape&#10;&#10;Description automatically generated">
+            <a:extLst>
+              <a:ext uri="{FF2B5EF4-FFF2-40B4-BE49-F238E27FC236}">
+                <a16:creationId xmlns:a16="http://schemas.microsoft.com/office/drawing/2014/main" id="{D10E816A-BC1E-4BF6-8CA8-00BEA6906B61}"/>
+              </a:ext>
+            </a:extLst>
+          </p:cNvPr>
+          <p:cNvPicPr>
+            <a:picLocks noChangeAspect="1"/>
+          </p:cNvPicPr>
+          <p:nvPr/>
+        </p:nvPicPr>
+        <p:blipFill>
+          <a:blip r:embed="rId2">
+            <a:extLst>
+              <a:ext uri="{28A0092B-C50C-407E-A947-70E740481C1C}">
+                <a14:useLocalDpi xmlns:a14="http://schemas.microsoft.com/office/drawing/2010/main" val="0"/>
+              </a:ext>
+            </a:extLst>
+          </a:blip>
+          <a:stretch>
+            <a:fillRect/>
+          </a:stretch>
+        </p:blipFill>
+        <p:spPr>
+          <a:xfrm>
+            <a:off x="1653469" y="1285329"/>
+            <a:ext cx="7315200" cy="2813538"/>
+          </a:xfrm>
+          <a:prstGeom prst="rect">
+            <a:avLst/>
+          </a:prstGeom>
+        </p:spPr>
+      </p:pic>
+      <p:pic>
+        <p:nvPicPr>
+          <p:cNvPr id="7" name="Picture 6" descr="Graphical user interface, chart, line chart&#10;&#10;Description automatically generated">
+            <a:extLst>
+              <a:ext uri="{FF2B5EF4-FFF2-40B4-BE49-F238E27FC236}">
+                <a16:creationId xmlns:a16="http://schemas.microsoft.com/office/drawing/2014/main" id="{10BDBA49-C2B6-4225-BE1A-3A5454B2C3F8}"/>
+              </a:ext>
+            </a:extLst>
+          </p:cNvPr>
+          <p:cNvPicPr>
+            <a:picLocks noChangeAspect="1"/>
+          </p:cNvPicPr>
+          <p:nvPr/>
+        </p:nvPicPr>
+        <p:blipFill>
+          <a:blip r:embed="rId3">
+            <a:extLst>
+              <a:ext uri="{28A0092B-C50C-407E-A947-70E740481C1C}">
+                <a14:useLocalDpi xmlns:a14="http://schemas.microsoft.com/office/drawing/2010/main" val="0"/>
+              </a:ext>
+            </a:extLst>
+          </a:blip>
+          <a:stretch>
+            <a:fillRect/>
+          </a:stretch>
+        </p:blipFill>
+        <p:spPr>
+          <a:xfrm>
+            <a:off x="1653469" y="3824342"/>
+            <a:ext cx="7315200" cy="2813538"/>
+          </a:xfrm>
+          <a:prstGeom prst="rect">
+            <a:avLst/>
+          </a:prstGeom>
+        </p:spPr>
+      </p:pic>
+      <p:sp>
+        <p:nvSpPr>
+          <p:cNvPr id="8" name="TextBox 7">
+            <a:extLst>
+              <a:ext uri="{FF2B5EF4-FFF2-40B4-BE49-F238E27FC236}">
+                <a16:creationId xmlns:a16="http://schemas.microsoft.com/office/drawing/2014/main" id="{24B69FAC-1BBE-493C-BFA2-B794B215E35E}"/>
+              </a:ext>
+            </a:extLst>
+          </p:cNvPr>
+          <p:cNvSpPr txBox="1"/>
+          <p:nvPr/>
+        </p:nvSpPr>
+        <p:spPr>
+          <a:xfrm>
+            <a:off x="8495930" y="2112885"/>
+            <a:ext cx="2467993" cy="3416320"/>
+          </a:xfrm>
+          <a:prstGeom prst="rect">
+            <a:avLst/>
+          </a:prstGeom>
+          <a:noFill/>
+        </p:spPr>
+        <p:txBody>
+          <a:bodyPr wrap="square" rtlCol="0">
+            <a:spAutoFit/>
+          </a:bodyPr>
+          <a:lstStyle/>
+          <a:p>
+            <a:r>
+              <a:rPr lang="en-US" dirty="0"/>
+              <a:t>Threshold: 0.6</a:t>
+            </a:r>
+          </a:p>
+          <a:p>
+            <a:endParaRPr lang="en-US" dirty="0"/>
+          </a:p>
+          <a:p>
+            <a:endParaRPr lang="en-US" dirty="0"/>
+          </a:p>
+          <a:p>
+            <a:endParaRPr lang="en-US" dirty="0"/>
+          </a:p>
+          <a:p>
+            <a:endParaRPr lang="en-US" dirty="0"/>
+          </a:p>
+          <a:p>
+            <a:endParaRPr lang="en-US" dirty="0"/>
+          </a:p>
+          <a:p>
+            <a:endParaRPr lang="en-US" dirty="0"/>
+          </a:p>
+          <a:p>
+            <a:endParaRPr lang="en-US" dirty="0"/>
+          </a:p>
+          <a:p>
+            <a:r>
+              <a:rPr lang="en-US" dirty="0"/>
+              <a:t>Threshold: 0.8</a:t>
+            </a:r>
+          </a:p>
+        </p:txBody>
+      </p:sp>
+    </p:spTree>
+    <p:extLst>
+      <p:ext uri="{BB962C8B-B14F-4D97-AF65-F5344CB8AC3E}">
+        <p14:creationId xmlns:p14="http://schemas.microsoft.com/office/powerpoint/2010/main" val="2310238097"/>
+      </p:ext>
+    </p:extLst>
+  </p:cSld>
+  <p:clrMapOvr>
+    <a:masterClrMapping/>
+  </p:clrMapOvr>
+</p:sld>
+</file>
+
+<file path=ppt/slides/slide19.xml><?xml version="1.0" encoding="utf-8"?>
+<p:sld xmlns:a="http://schemas.openxmlformats.org/drawingml/2006/main" xmlns:r="http://schemas.openxmlformats.org/officeDocument/2006/relationships" xmlns:p="http://schemas.openxmlformats.org/presentationml/2006/main">
+  <p:cSld>
+    <p:spTree>
+      <p:nvGrpSpPr>
+        <p:cNvPr id="1" name=""/>
+        <p:cNvGrpSpPr/>
+        <p:nvPr/>
+      </p:nvGrpSpPr>
+      <p:grpSpPr>
+        <a:xfrm>
+          <a:off x="0" y="0"/>
+          <a:ext cx="0" cy="0"/>
+          <a:chOff x="0" y="0"/>
+          <a:chExt cx="0" cy="0"/>
+        </a:xfrm>
+      </p:grpSpPr>
+      <p:sp>
+        <p:nvSpPr>
+          <p:cNvPr id="2" name="Title 1">
+            <a:extLst>
+              <a:ext uri="{FF2B5EF4-FFF2-40B4-BE49-F238E27FC236}">
+                <a16:creationId xmlns:a16="http://schemas.microsoft.com/office/drawing/2014/main" id="{7F644D1A-0950-40F1-A893-C3253F1D62CD}"/>
+              </a:ext>
+            </a:extLst>
+          </p:cNvPr>
+          <p:cNvSpPr>
+            <a:spLocks noGrp="1"/>
+          </p:cNvSpPr>
+          <p:nvPr>
+            <p:ph type="title"/>
+          </p:nvPr>
+        </p:nvSpPr>
+        <p:spPr/>
+        <p:txBody>
+          <a:bodyPr/>
+          <a:lstStyle/>
+          <a:p>
+            <a:r>
+              <a:rPr lang="en-US" dirty="0"/>
+              <a:t>Trained </a:t>
+            </a:r>
+            <a:r>
+              <a:rPr lang="en-US" dirty="0" err="1"/>
+              <a:t>rec_noise</a:t>
+            </a:r>
+            <a:r>
+              <a:rPr lang="en-US" dirty="0"/>
+              <a:t> 2.2; threshold 0.7; round 0</a:t>
+            </a:r>
+          </a:p>
+        </p:txBody>
+      </p:sp>
+      <p:pic>
+        <p:nvPicPr>
+          <p:cNvPr id="5" name="Picture 4" descr="A picture containing shape&#10;&#10;Description automatically generated">
+            <a:extLst>
+              <a:ext uri="{FF2B5EF4-FFF2-40B4-BE49-F238E27FC236}">
+                <a16:creationId xmlns:a16="http://schemas.microsoft.com/office/drawing/2014/main" id="{E4DCA269-38E3-4083-9064-3822D254B8FD}"/>
+              </a:ext>
+            </a:extLst>
+          </p:cNvPr>
+          <p:cNvPicPr>
+            <a:picLocks noChangeAspect="1"/>
+          </p:cNvPicPr>
+          <p:nvPr/>
+        </p:nvPicPr>
+        <p:blipFill>
+          <a:blip r:embed="rId2">
+            <a:extLst>
+              <a:ext uri="{28A0092B-C50C-407E-A947-70E740481C1C}">
+                <a14:useLocalDpi xmlns:a14="http://schemas.microsoft.com/office/drawing/2010/main" val="0"/>
+              </a:ext>
+            </a:extLst>
+          </a:blip>
+          <a:stretch>
+            <a:fillRect/>
+          </a:stretch>
+        </p:blipFill>
+        <p:spPr>
+          <a:xfrm>
+            <a:off x="153143" y="1143286"/>
+            <a:ext cx="11885714" cy="4571428"/>
+          </a:xfrm>
+          <a:prstGeom prst="rect">
+            <a:avLst/>
+          </a:prstGeom>
+        </p:spPr>
+      </p:pic>
+    </p:spTree>
+    <p:extLst>
+      <p:ext uri="{BB962C8B-B14F-4D97-AF65-F5344CB8AC3E}">
+        <p14:creationId xmlns:p14="http://schemas.microsoft.com/office/powerpoint/2010/main" val="336565939"/>
+      </p:ext>
+    </p:extLst>
+  </p:cSld>
+  <p:clrMapOvr>
+    <a:masterClrMapping/>
+  </p:clrMapOvr>
+</p:sld>
+</file>
+
+<file path=ppt/slides/slide2.xml><?xml version="1.0" encoding="utf-8"?>
+<p:sld xmlns:a="http://schemas.openxmlformats.org/drawingml/2006/main" xmlns:r="http://schemas.openxmlformats.org/officeDocument/2006/relationships" xmlns:p="http://schemas.openxmlformats.org/presentationml/2006/main">
+  <p:cSld>
+    <p:spTree>
+      <p:nvGrpSpPr>
+        <p:cNvPr id="1" name=""/>
+        <p:cNvGrpSpPr/>
+        <p:nvPr/>
+      </p:nvGrpSpPr>
+      <p:grpSpPr>
+        <a:xfrm>
+          <a:off x="0" y="0"/>
+          <a:ext cx="0" cy="0"/>
+          <a:chOff x="0" y="0"/>
+          <a:chExt cx="0" cy="0"/>
+        </a:xfrm>
+      </p:grpSpPr>
+      <p:sp>
+        <p:nvSpPr>
+          <p:cNvPr id="2" name="Title 1">
+            <a:extLst>
+              <a:ext uri="{FF2B5EF4-FFF2-40B4-BE49-F238E27FC236}">
+                <a16:creationId xmlns:a16="http://schemas.microsoft.com/office/drawing/2014/main" id="{C3C6F60E-9C9E-45C3-A3D6-6467A1426616}"/>
+              </a:ext>
+            </a:extLst>
+          </p:cNvPr>
+          <p:cNvSpPr>
+            <a:spLocks noGrp="1"/>
+          </p:cNvSpPr>
+          <p:nvPr>
+            <p:ph type="title"/>
+          </p:nvPr>
+        </p:nvSpPr>
+        <p:spPr/>
+        <p:txBody>
+          <a:bodyPr/>
+          <a:lstStyle/>
+          <a:p>
+            <a:r>
+              <a:rPr lang="en-US" dirty="0"/>
+              <a:t>Basic model</a:t>
+            </a:r>
+          </a:p>
+        </p:txBody>
+      </p:sp>
+      <mc:AlternateContent xmlns:mc="http://schemas.openxmlformats.org/markup-compatibility/2006" xmlns:a14="http://schemas.microsoft.com/office/drawing/2010/main">
+        <mc:Choice Requires="a14">
+          <p:sp>
+            <p:nvSpPr>
+              <p:cNvPr id="3" name="Content Placeholder 2">
+                <a:extLst>
+                  <a:ext uri="{FF2B5EF4-FFF2-40B4-BE49-F238E27FC236}">
+                    <a16:creationId xmlns:a16="http://schemas.microsoft.com/office/drawing/2014/main" id="{7F9BF9D3-0A5C-4893-8395-03C903430E93}"/>
+                  </a:ext>
+                </a:extLst>
+              </p:cNvPr>
+              <p:cNvSpPr>
+                <a:spLocks noGrp="1"/>
+              </p:cNvSpPr>
+              <p:nvPr>
+                <p:ph idx="1"/>
+              </p:nvPr>
+            </p:nvSpPr>
+            <p:spPr/>
+            <p:txBody>
+              <a:bodyPr/>
+              <a:lstStyle/>
+              <a:p>
+                <a14:m>
+                  <m:oMath xmlns:m="http://schemas.openxmlformats.org/officeDocument/2006/math">
+                    <m:sSub>
+                      <m:sSubPr>
+                        <m:ctrlPr>
+                          <a:rPr lang="en-US" i="1" smtClean="0">
+                            <a:latin typeface="Cambria Math" panose="02040503050406030204" pitchFamily="18" charset="0"/>
+                          </a:rPr>
+                        </m:ctrlPr>
+                      </m:sSubPr>
+                      <m:e>
+                        <m:r>
+                          <a:rPr lang="en-US" b="0" i="1" smtClean="0">
+                            <a:latin typeface="Cambria Math" panose="02040503050406030204" pitchFamily="18" charset="0"/>
+                          </a:rPr>
+                          <m:t>𝑥</m:t>
+                        </m:r>
+                      </m:e>
+                      <m:sub>
+                        <m:r>
+                          <a:rPr lang="en-US" b="0" i="1" smtClean="0">
+                            <a:latin typeface="Cambria Math" panose="02040503050406030204" pitchFamily="18" charset="0"/>
+                          </a:rPr>
+                          <m:t>𝑡</m:t>
+                        </m:r>
+                        <m:r>
+                          <a:rPr lang="en-US" b="0" i="1" smtClean="0">
+                            <a:latin typeface="Cambria Math" panose="02040503050406030204" pitchFamily="18" charset="0"/>
+                          </a:rPr>
+                          <m:t>+1</m:t>
+                        </m:r>
+                      </m:sub>
+                    </m:sSub>
+                    <m:r>
+                      <a:rPr lang="en-US" i="1" smtClean="0">
+                        <a:latin typeface="Cambria Math" panose="02040503050406030204" pitchFamily="18" charset="0"/>
+                      </a:rPr>
+                      <m:t>=</m:t>
+                    </m:r>
+                  </m:oMath>
+                </a14:m>
+                <a:r>
+                  <a:rPr lang="en-US" dirty="0"/>
+                  <a:t> </a:t>
+                </a:r>
+                <a14:m>
+                  <m:oMath xmlns:m="http://schemas.openxmlformats.org/officeDocument/2006/math">
+                    <m:d>
+                      <m:dPr>
+                        <m:ctrlPr>
+                          <a:rPr lang="en-US" b="0" i="1" smtClean="0">
+                            <a:latin typeface="Cambria Math" panose="02040503050406030204" pitchFamily="18" charset="0"/>
+                          </a:rPr>
+                        </m:ctrlPr>
+                      </m:dPr>
+                      <m:e>
+                        <m:r>
+                          <a:rPr lang="en-US" b="0" i="0" smtClean="0">
+                            <a:latin typeface="Cambria Math" panose="02040503050406030204" pitchFamily="18" charset="0"/>
+                          </a:rPr>
+                          <m:t>1−</m:t>
+                        </m:r>
+                        <m:r>
+                          <m:rPr>
+                            <m:sty m:val="p"/>
+                          </m:rPr>
+                          <a:rPr lang="el-GR" b="0" i="1" smtClean="0">
+                            <a:latin typeface="Cambria Math" panose="02040503050406030204" pitchFamily="18" charset="0"/>
+                          </a:rPr>
+                          <m:t>α</m:t>
+                        </m:r>
+                      </m:e>
+                    </m:d>
+                    <m:r>
+                      <a:rPr lang="en-US" b="0" i="0" smtClean="0">
+                        <a:latin typeface="Cambria Math" panose="02040503050406030204" pitchFamily="18" charset="0"/>
+                      </a:rPr>
+                      <m:t>∗</m:t>
+                    </m:r>
+                    <m:sSub>
+                      <m:sSubPr>
+                        <m:ctrlPr>
+                          <a:rPr lang="en-US" i="1">
+                            <a:latin typeface="Cambria Math" panose="02040503050406030204" pitchFamily="18" charset="0"/>
+                          </a:rPr>
+                        </m:ctrlPr>
+                      </m:sSubPr>
+                      <m:e>
+                        <m:r>
+                          <a:rPr lang="en-US" i="1">
+                            <a:latin typeface="Cambria Math" panose="02040503050406030204" pitchFamily="18" charset="0"/>
+                          </a:rPr>
+                          <m:t>𝑥</m:t>
+                        </m:r>
+                      </m:e>
+                      <m:sub>
+                        <m:r>
+                          <a:rPr lang="en-US" i="1">
+                            <a:latin typeface="Cambria Math" panose="02040503050406030204" pitchFamily="18" charset="0"/>
+                          </a:rPr>
+                          <m:t>𝑡</m:t>
+                        </m:r>
+                      </m:sub>
+                    </m:sSub>
+                    <m:r>
+                      <a:rPr lang="en-US" b="0" i="1" smtClean="0">
+                        <a:latin typeface="Cambria Math" panose="02040503050406030204" pitchFamily="18" charset="0"/>
+                      </a:rPr>
+                      <m:t>+</m:t>
+                    </m:r>
+                    <m:r>
+                      <m:rPr>
+                        <m:sty m:val="p"/>
+                      </m:rPr>
+                      <a:rPr lang="el-GR" b="0" i="1" smtClean="0">
+                        <a:latin typeface="Cambria Math" panose="02040503050406030204" pitchFamily="18" charset="0"/>
+                      </a:rPr>
+                      <m:t>α</m:t>
+                    </m:r>
+                    <m:r>
+                      <a:rPr lang="en-US" b="0" i="1" smtClean="0">
+                        <a:latin typeface="Cambria Math" panose="02040503050406030204" pitchFamily="18" charset="0"/>
+                      </a:rPr>
+                      <m:t>∗</m:t>
+                    </m:r>
+                    <m:d>
+                      <m:dPr>
+                        <m:ctrlPr>
+                          <a:rPr lang="en-US" b="0" i="1" smtClean="0">
+                            <a:latin typeface="Cambria Math" panose="02040503050406030204" pitchFamily="18" charset="0"/>
+                          </a:rPr>
+                        </m:ctrlPr>
+                      </m:dPr>
+                      <m:e>
+                        <m:sSup>
+                          <m:sSupPr>
+                            <m:ctrlPr>
+                              <a:rPr lang="en-US" b="0" i="1" smtClean="0">
+                                <a:latin typeface="Cambria Math" panose="02040503050406030204" pitchFamily="18" charset="0"/>
+                              </a:rPr>
+                            </m:ctrlPr>
+                          </m:sSupPr>
+                          <m:e>
+                            <m:r>
+                              <a:rPr lang="en-US" b="0" i="1" smtClean="0">
+                                <a:latin typeface="Cambria Math" panose="02040503050406030204" pitchFamily="18" charset="0"/>
+                              </a:rPr>
+                              <m:t>𝑊</m:t>
+                            </m:r>
+                          </m:e>
+                          <m:sup>
+                            <m:r>
+                              <a:rPr lang="en-US" b="0" i="1" smtClean="0">
+                                <a:latin typeface="Cambria Math" panose="02040503050406030204" pitchFamily="18" charset="0"/>
+                              </a:rPr>
+                              <m:t>𝑟𝑒𝑐</m:t>
+                            </m:r>
+                          </m:sup>
+                        </m:sSup>
+                        <m:r>
+                          <a:rPr lang="en-US" b="0" i="1" smtClean="0">
+                            <a:latin typeface="Cambria Math" panose="02040503050406030204" pitchFamily="18" charset="0"/>
+                          </a:rPr>
+                          <m:t>∗</m:t>
+                        </m:r>
+                        <m:r>
+                          <a:rPr lang="en-US" b="0" i="1" smtClean="0">
+                            <a:latin typeface="Cambria Math" panose="02040503050406030204" pitchFamily="18" charset="0"/>
+                          </a:rPr>
+                          <m:t>𝑟𝑒𝑙𝑢</m:t>
+                        </m:r>
+                        <m:d>
+                          <m:dPr>
+                            <m:ctrlPr>
+                              <a:rPr lang="en-US" b="0" i="1" smtClean="0">
+                                <a:latin typeface="Cambria Math" panose="02040503050406030204" pitchFamily="18" charset="0"/>
+                              </a:rPr>
+                            </m:ctrlPr>
+                          </m:dPr>
+                          <m:e>
+                            <m:sSub>
+                              <m:sSubPr>
+                                <m:ctrlPr>
+                                  <a:rPr lang="en-US" i="1">
+                                    <a:latin typeface="Cambria Math" panose="02040503050406030204" pitchFamily="18" charset="0"/>
+                                  </a:rPr>
+                                </m:ctrlPr>
+                              </m:sSubPr>
+                              <m:e>
+                                <m:r>
+                                  <a:rPr lang="en-US" i="1">
+                                    <a:latin typeface="Cambria Math" panose="02040503050406030204" pitchFamily="18" charset="0"/>
+                                  </a:rPr>
+                                  <m:t>𝑥</m:t>
+                                </m:r>
+                              </m:e>
+                              <m:sub>
+                                <m:r>
+                                  <a:rPr lang="en-US" i="1">
+                                    <a:latin typeface="Cambria Math" panose="02040503050406030204" pitchFamily="18" charset="0"/>
+                                  </a:rPr>
+                                  <m:t>𝑡</m:t>
+                                </m:r>
+                              </m:sub>
+                            </m:sSub>
+                          </m:e>
+                        </m:d>
+                        <m:r>
+                          <a:rPr lang="en-US" b="0" i="1" smtClean="0">
+                            <a:latin typeface="Cambria Math" panose="02040503050406030204" pitchFamily="18" charset="0"/>
+                          </a:rPr>
+                          <m:t>+</m:t>
+                        </m:r>
+                        <m:sSup>
+                          <m:sSupPr>
+                            <m:ctrlPr>
+                              <a:rPr lang="en-US" i="1">
+                                <a:latin typeface="Cambria Math" panose="02040503050406030204" pitchFamily="18" charset="0"/>
+                              </a:rPr>
+                            </m:ctrlPr>
+                          </m:sSupPr>
+                          <m:e>
+                            <m:r>
+                              <a:rPr lang="en-US" i="1">
+                                <a:latin typeface="Cambria Math" panose="02040503050406030204" pitchFamily="18" charset="0"/>
+                              </a:rPr>
+                              <m:t>𝑊</m:t>
+                            </m:r>
+                          </m:e>
+                          <m:sup>
+                            <m:r>
+                              <a:rPr lang="en-US" i="1">
+                                <a:latin typeface="Cambria Math" panose="02040503050406030204" pitchFamily="18" charset="0"/>
+                              </a:rPr>
+                              <m:t>𝑟𝑒𝑐</m:t>
+                            </m:r>
+                          </m:sup>
+                        </m:sSup>
+                        <m:r>
+                          <a:rPr lang="en-US" b="0" i="1" smtClean="0">
+                            <a:latin typeface="Cambria Math" panose="02040503050406030204" pitchFamily="18" charset="0"/>
+                          </a:rPr>
+                          <m:t>∗</m:t>
+                        </m:r>
+                        <m:sSub>
+                          <m:sSubPr>
+                            <m:ctrlPr>
+                              <a:rPr lang="en-US" i="1">
+                                <a:latin typeface="Cambria Math" panose="02040503050406030204" pitchFamily="18" charset="0"/>
+                              </a:rPr>
+                            </m:ctrlPr>
+                          </m:sSubPr>
+                          <m:e>
+                            <m:r>
+                              <a:rPr lang="en-US" b="0" i="1" smtClean="0">
+                                <a:latin typeface="Cambria Math" panose="02040503050406030204" pitchFamily="18" charset="0"/>
+                              </a:rPr>
+                              <m:t>𝑢</m:t>
+                            </m:r>
+                          </m:e>
+                          <m:sub>
+                            <m:r>
+                              <a:rPr lang="en-US" i="1">
+                                <a:latin typeface="Cambria Math" panose="02040503050406030204" pitchFamily="18" charset="0"/>
+                              </a:rPr>
+                              <m:t>𝑡</m:t>
+                            </m:r>
+                          </m:sub>
+                        </m:sSub>
+                        <m:r>
+                          <a:rPr lang="en-US" b="0" i="1" smtClean="0">
+                            <a:latin typeface="Cambria Math" panose="02040503050406030204" pitchFamily="18" charset="0"/>
+                          </a:rPr>
+                          <m:t>+</m:t>
+                        </m:r>
+                        <m:sSub>
+                          <m:sSubPr>
+                            <m:ctrlPr>
+                              <a:rPr lang="en-US" i="1">
+                                <a:latin typeface="Cambria Math" panose="02040503050406030204" pitchFamily="18" charset="0"/>
+                              </a:rPr>
+                            </m:ctrlPr>
+                          </m:sSubPr>
+                          <m:e>
+                            <m:r>
+                              <a:rPr lang="en-US" b="0" i="1" smtClean="0">
+                                <a:latin typeface="Cambria Math" panose="02040503050406030204" pitchFamily="18" charset="0"/>
+                              </a:rPr>
+                              <m:t>𝑏</m:t>
+                            </m:r>
+                          </m:e>
+                          <m:sub>
+                            <m:r>
+                              <a:rPr lang="en-US" b="0" i="1" smtClean="0">
+                                <a:latin typeface="Cambria Math" panose="02040503050406030204" pitchFamily="18" charset="0"/>
+                              </a:rPr>
+                              <m:t>𝑟𝑒𝑐</m:t>
+                            </m:r>
+                          </m:sub>
+                        </m:sSub>
+                      </m:e>
+                    </m:d>
+                    <m:r>
+                      <a:rPr lang="en-US" b="0" i="1" smtClean="0">
+                        <a:latin typeface="Cambria Math" panose="02040503050406030204" pitchFamily="18" charset="0"/>
+                      </a:rPr>
+                      <m:t>+</m:t>
+                    </m:r>
+                    <m:rad>
+                      <m:radPr>
+                        <m:degHide m:val="on"/>
+                        <m:ctrlPr>
+                          <a:rPr lang="en-US" b="0" i="1" smtClean="0">
+                            <a:latin typeface="Cambria Math" panose="02040503050406030204" pitchFamily="18" charset="0"/>
+                          </a:rPr>
+                        </m:ctrlPr>
+                      </m:radPr>
+                      <m:deg/>
+                      <m:e>
+                        <m:r>
+                          <a:rPr lang="en-US" b="0" i="1" smtClean="0">
+                            <a:latin typeface="Cambria Math" panose="02040503050406030204" pitchFamily="18" charset="0"/>
+                          </a:rPr>
+                          <m:t>2∗</m:t>
+                        </m:r>
+                        <m:r>
+                          <m:rPr>
+                            <m:sty m:val="p"/>
+                          </m:rPr>
+                          <a:rPr lang="el-GR" i="1">
+                            <a:latin typeface="Cambria Math" panose="02040503050406030204" pitchFamily="18" charset="0"/>
+                          </a:rPr>
+                          <m:t>α</m:t>
+                        </m:r>
+                        <m:r>
+                          <a:rPr lang="en-US" b="0" i="1" smtClean="0">
+                            <a:latin typeface="Cambria Math" panose="02040503050406030204" pitchFamily="18" charset="0"/>
+                          </a:rPr>
+                          <m:t>∗</m:t>
+                        </m:r>
+                        <m:sSubSup>
+                          <m:sSubSupPr>
+                            <m:ctrlPr>
+                              <a:rPr lang="en-US" i="1" smtClean="0">
+                                <a:latin typeface="Cambria Math" panose="02040503050406030204" pitchFamily="18" charset="0"/>
+                              </a:rPr>
+                            </m:ctrlPr>
+                          </m:sSubSupPr>
+                          <m:e>
+                            <m:r>
+                              <a:rPr lang="en-US" b="0" i="1" smtClean="0">
+                                <a:latin typeface="Cambria Math" panose="02040503050406030204" pitchFamily="18" charset="0"/>
+                              </a:rPr>
+                              <m:t>𝑁</m:t>
+                            </m:r>
+                          </m:e>
+                          <m:sub>
+                            <m:r>
+                              <a:rPr lang="en-US" b="0" i="1" smtClean="0">
+                                <a:latin typeface="Cambria Math" panose="02040503050406030204" pitchFamily="18" charset="0"/>
+                              </a:rPr>
+                              <m:t>𝑟𝑒𝑐</m:t>
+                            </m:r>
+                          </m:sub>
+                          <m:sup>
+                            <m:r>
+                              <a:rPr lang="en-US" b="0" i="1" smtClean="0">
+                                <a:latin typeface="Cambria Math" panose="02040503050406030204" pitchFamily="18" charset="0"/>
+                              </a:rPr>
+                              <m:t>2</m:t>
+                            </m:r>
+                          </m:sup>
+                        </m:sSubSup>
+                      </m:e>
+                    </m:rad>
+                    <m:r>
+                      <a:rPr lang="en-US" b="0" i="1" smtClean="0">
+                        <a:latin typeface="Cambria Math" panose="02040503050406030204" pitchFamily="18" charset="0"/>
+                      </a:rPr>
+                      <m:t>+</m:t>
+                    </m:r>
+                    <m:r>
+                      <a:rPr lang="en-US" b="0" i="1" smtClean="0">
+                        <a:latin typeface="Cambria Math" panose="02040503050406030204" pitchFamily="18" charset="0"/>
+                      </a:rPr>
+                      <m:t>𝑁</m:t>
+                    </m:r>
+                    <m:r>
+                      <a:rPr lang="en-US" b="0" i="1" smtClean="0">
+                        <a:latin typeface="Cambria Math" panose="02040503050406030204" pitchFamily="18" charset="0"/>
+                      </a:rPr>
+                      <m:t>(0,1)</m:t>
+                    </m:r>
+                  </m:oMath>
+                </a14:m>
+                <a:endParaRPr lang="en-US" b="0" dirty="0"/>
+              </a:p>
+              <a:p>
+                <a:pPr marL="0" indent="0">
+                  <a:buNone/>
+                </a:pPr>
+                <a:endParaRPr lang="en-US" b="0" dirty="0"/>
+              </a:p>
+              <a:p>
+                <a14:m>
+                  <m:oMath xmlns:m="http://schemas.openxmlformats.org/officeDocument/2006/math">
+                    <m:sSub>
+                      <m:sSubPr>
+                        <m:ctrlPr>
+                          <a:rPr lang="en-US" i="1">
+                            <a:latin typeface="Cambria Math" panose="02040503050406030204" pitchFamily="18" charset="0"/>
+                          </a:rPr>
+                        </m:ctrlPr>
+                      </m:sSubPr>
+                      <m:e>
+                        <m:r>
+                          <a:rPr lang="en-US" b="0" i="1" smtClean="0">
+                            <a:latin typeface="Cambria Math" panose="02040503050406030204" pitchFamily="18" charset="0"/>
+                          </a:rPr>
+                          <m:t>𝑦</m:t>
+                        </m:r>
+                      </m:e>
+                      <m:sub>
+                        <m:r>
+                          <a:rPr lang="en-US" i="1">
+                            <a:latin typeface="Cambria Math" panose="02040503050406030204" pitchFamily="18" charset="0"/>
+                          </a:rPr>
+                          <m:t>𝑡</m:t>
+                        </m:r>
+                        <m:r>
+                          <a:rPr lang="en-US" b="0" i="1" smtClean="0">
+                            <a:latin typeface="Cambria Math" panose="02040503050406030204" pitchFamily="18" charset="0"/>
+                          </a:rPr>
+                          <m:t>+1</m:t>
+                        </m:r>
+                      </m:sub>
+                    </m:sSub>
+                    <m:r>
+                      <a:rPr lang="en-US" i="1">
+                        <a:latin typeface="Cambria Math" panose="02040503050406030204" pitchFamily="18" charset="0"/>
+                      </a:rPr>
+                      <m:t>=</m:t>
+                    </m:r>
+                    <m:r>
+                      <m:rPr>
+                        <m:nor/>
+                      </m:rPr>
+                      <a:rPr lang="en-US" dirty="0"/>
+                      <m:t> </m:t>
+                    </m:r>
+                    <m:d>
+                      <m:dPr>
+                        <m:ctrlPr>
+                          <a:rPr lang="en-US" i="1">
+                            <a:latin typeface="Cambria Math" panose="02040503050406030204" pitchFamily="18" charset="0"/>
+                          </a:rPr>
+                        </m:ctrlPr>
+                      </m:dPr>
+                      <m:e>
+                        <m:sSup>
+                          <m:sSupPr>
+                            <m:ctrlPr>
+                              <a:rPr lang="en-US" i="1">
+                                <a:latin typeface="Cambria Math" panose="02040503050406030204" pitchFamily="18" charset="0"/>
+                              </a:rPr>
+                            </m:ctrlPr>
+                          </m:sSupPr>
+                          <m:e>
+                            <m:r>
+                              <a:rPr lang="en-US" i="1">
+                                <a:latin typeface="Cambria Math" panose="02040503050406030204" pitchFamily="18" charset="0"/>
+                              </a:rPr>
+                              <m:t>𝑊</m:t>
+                            </m:r>
+                          </m:e>
+                          <m:sup>
+                            <m:r>
+                              <a:rPr lang="en-US" b="0" i="1" smtClean="0">
+                                <a:latin typeface="Cambria Math" panose="02040503050406030204" pitchFamily="18" charset="0"/>
+                              </a:rPr>
+                              <m:t>𝑜𝑢𝑡</m:t>
+                            </m:r>
+                          </m:sup>
+                        </m:sSup>
+                        <m:r>
+                          <a:rPr lang="en-US" i="1">
+                            <a:latin typeface="Cambria Math" panose="02040503050406030204" pitchFamily="18" charset="0"/>
+                          </a:rPr>
+                          <m:t>∗</m:t>
+                        </m:r>
+                        <m:r>
+                          <a:rPr lang="en-US" i="1">
+                            <a:latin typeface="Cambria Math" panose="02040503050406030204" pitchFamily="18" charset="0"/>
+                          </a:rPr>
+                          <m:t>𝑟𝑒𝑙𝑢</m:t>
+                        </m:r>
+                        <m:d>
+                          <m:dPr>
+                            <m:ctrlPr>
+                              <a:rPr lang="en-US" i="1">
+                                <a:latin typeface="Cambria Math" panose="02040503050406030204" pitchFamily="18" charset="0"/>
+                              </a:rPr>
+                            </m:ctrlPr>
+                          </m:dPr>
+                          <m:e>
+                            <m:sSub>
+                              <m:sSubPr>
+                                <m:ctrlPr>
+                                  <a:rPr lang="en-US" i="1">
+                                    <a:latin typeface="Cambria Math" panose="02040503050406030204" pitchFamily="18" charset="0"/>
+                                  </a:rPr>
+                                </m:ctrlPr>
+                              </m:sSubPr>
+                              <m:e>
+                                <m:r>
+                                  <a:rPr lang="en-US" i="1">
+                                    <a:latin typeface="Cambria Math" panose="02040503050406030204" pitchFamily="18" charset="0"/>
+                                  </a:rPr>
+                                  <m:t>𝑥</m:t>
+                                </m:r>
+                              </m:e>
+                              <m:sub>
+                                <m:r>
+                                  <a:rPr lang="en-US" i="1">
+                                    <a:latin typeface="Cambria Math" panose="02040503050406030204" pitchFamily="18" charset="0"/>
+                                  </a:rPr>
+                                  <m:t>𝑡</m:t>
+                                </m:r>
+                                <m:r>
+                                  <a:rPr lang="en-US" b="0" i="1" smtClean="0">
+                                    <a:latin typeface="Cambria Math" panose="02040503050406030204" pitchFamily="18" charset="0"/>
+                                  </a:rPr>
+                                  <m:t>+1</m:t>
+                                </m:r>
+                              </m:sub>
+                            </m:sSub>
+                          </m:e>
+                        </m:d>
+                        <m:r>
+                          <a:rPr lang="en-US" i="1">
+                            <a:latin typeface="Cambria Math" panose="02040503050406030204" pitchFamily="18" charset="0"/>
+                          </a:rPr>
+                          <m:t>+</m:t>
+                        </m:r>
+                        <m:sSub>
+                          <m:sSubPr>
+                            <m:ctrlPr>
+                              <a:rPr lang="en-US" i="1">
+                                <a:latin typeface="Cambria Math" panose="02040503050406030204" pitchFamily="18" charset="0"/>
+                              </a:rPr>
+                            </m:ctrlPr>
+                          </m:sSubPr>
+                          <m:e>
+                            <m:r>
+                              <a:rPr lang="en-US" i="1">
+                                <a:latin typeface="Cambria Math" panose="02040503050406030204" pitchFamily="18" charset="0"/>
+                              </a:rPr>
+                              <m:t>𝑏</m:t>
+                            </m:r>
+                          </m:e>
+                          <m:sub>
+                            <m:r>
+                              <a:rPr lang="en-US" b="0" i="1" smtClean="0">
+                                <a:latin typeface="Cambria Math" panose="02040503050406030204" pitchFamily="18" charset="0"/>
+                              </a:rPr>
+                              <m:t>𝑜𝑢𝑡</m:t>
+                            </m:r>
+                          </m:sub>
+                        </m:sSub>
+                      </m:e>
+                    </m:d>
+                  </m:oMath>
+                </a14:m>
+                <a:endParaRPr lang="en-US" dirty="0"/>
+              </a:p>
+            </p:txBody>
+          </p:sp>
+        </mc:Choice>
+        <mc:Fallback xmlns="">
+          <p:sp>
+            <p:nvSpPr>
+              <p:cNvPr id="3" name="Content Placeholder 2">
+                <a:extLst>
+                  <a:ext uri="{FF2B5EF4-FFF2-40B4-BE49-F238E27FC236}">
+                    <a16:creationId xmlns:a16="http://schemas.microsoft.com/office/drawing/2014/main" id="{7F9BF9D3-0A5C-4893-8395-03C903430E93}"/>
+                  </a:ext>
+                </a:extLst>
+              </p:cNvPr>
+              <p:cNvSpPr>
+                <a:spLocks noGrp="1" noRot="1" noChangeAspect="1" noMove="1" noResize="1" noEditPoints="1" noAdjustHandles="1" noChangeArrowheads="1" noChangeShapeType="1" noTextEdit="1"/>
+              </p:cNvSpPr>
+              <p:nvPr>
+                <p:ph idx="1"/>
+              </p:nvPr>
+            </p:nvSpPr>
+            <p:spPr>
+              <a:blipFill>
+                <a:blip r:embed="rId2"/>
+                <a:stretch>
+                  <a:fillRect/>
+                </a:stretch>
+              </a:blipFill>
+            </p:spPr>
+            <p:txBody>
+              <a:bodyPr/>
+              <a:lstStyle/>
+              <a:p>
+                <a:r>
+                  <a:rPr lang="en-US">
+                    <a:noFill/>
+                  </a:rPr>
+                  <a:t> </a:t>
+                </a:r>
+              </a:p>
+            </p:txBody>
+          </p:sp>
+        </mc:Fallback>
+      </mc:AlternateContent>
+      <p:sp>
+        <p:nvSpPr>
+          <p:cNvPr id="4" name="Rectangle 1">
+            <a:extLst>
+              <a:ext uri="{FF2B5EF4-FFF2-40B4-BE49-F238E27FC236}">
+                <a16:creationId xmlns:a16="http://schemas.microsoft.com/office/drawing/2014/main" id="{55588CFC-EB20-4D86-96AB-D0D923E3C805}"/>
+              </a:ext>
+            </a:extLst>
+          </p:cNvPr>
+          <p:cNvSpPr>
+            <a:spLocks noChangeArrowheads="1"/>
+          </p:cNvSpPr>
+          <p:nvPr/>
+        </p:nvSpPr>
+        <p:spPr bwMode="auto">
+          <a:xfrm>
+            <a:off x="0" y="0"/>
+            <a:ext cx="12192000" cy="457200"/>
+          </a:xfrm>
+          <a:prstGeom prst="rect">
+            <a:avLst/>
+          </a:prstGeom>
+          <a:noFill/>
+          <a:ln>
+            <a:noFill/>
+          </a:ln>
+          <a:effectLst/>
+          <a:extLst>
+            <a:ext uri="{909E8E84-426E-40DD-AFC4-6F175D3DCCD1}">
+              <a14:hiddenFill xmlns:a14="http://schemas.microsoft.com/office/drawing/2010/main">
+                <a:solidFill>
+                  <a:schemeClr val="accent1"/>
+                </a:solidFill>
+              </a14:hiddenFill>
+            </a:ext>
+            <a:ext uri="{91240B29-F687-4F45-9708-019B960494DF}">
+              <a14:hiddenLine xmlns:a14="http://schemas.microsoft.com/office/drawing/2010/main" w="9525">
+                <a:solidFill>
+                  <a:schemeClr val="tx1"/>
+                </a:solidFill>
+                <a:miter lim="800000"/>
+                <a:headEnd/>
+                <a:tailEnd/>
+              </a14:hiddenLine>
+            </a:ext>
+            <a:ext uri="{AF507438-7753-43E0-B8FC-AC1667EBCBE1}">
+              <a14:hiddenEffects xmlns:a14="http://schemas.microsoft.com/office/drawing/2010/main">
+                <a:effectLst>
+                  <a:outerShdw dist="35921" dir="2700000" algn="ctr" rotWithShape="0">
+                    <a:schemeClr val="bg2"/>
+                  </a:outerShdw>
+                </a:effectLst>
+              </a14:hiddenEffects>
+            </a:ext>
+          </a:extLst>
+        </p:spPr>
+        <p:txBody>
+          <a:bodyPr vert="horz" wrap="none" lIns="0" tIns="0" rIns="0" bIns="0" numCol="1" anchor="ctr" anchorCtr="0" compatLnSpc="1">
+            <a:prstTxWarp prst="textNoShape">
+              <a:avLst/>
+            </a:prstTxWarp>
+            <a:spAutoFit/>
+          </a:bodyPr>
+          <a:lstStyle/>
+          <a:p>
+            <a:pPr marL="0" marR="0" lvl="0" indent="0" algn="l" defTabSz="914400" rtl="0" eaLnBrk="0" fontAlgn="base" latinLnBrk="0" hangingPunct="0">
+              <a:lnSpc>
+                <a:spcPct val="100000"/>
+              </a:lnSpc>
+              <a:spcBef>
+                <a:spcPct val="0"/>
+              </a:spcBef>
+              <a:spcAft>
+                <a:spcPct val="0"/>
+              </a:spcAft>
+              <a:buClrTx/>
+              <a:buSzTx/>
+              <a:buFontTx/>
+              <a:buNone/>
+              <a:tabLst/>
+            </a:pPr>
+            <a:r>
+              <a:rPr kumimoji="0" lang="en-US" altLang="en-US" sz="900" b="0" i="0" u="none" strike="noStrike" cap="none" normalizeH="0" baseline="0">
+                <a:ln>
+                  <a:noFill/>
+                </a:ln>
+                <a:solidFill>
+                  <a:schemeClr val="tx1"/>
+                </a:solidFill>
+                <a:effectLst/>
+                <a:latin typeface="Arial Unicode MS"/>
+                <a:ea typeface="inherit"/>
+              </a:rPr>
+              <a:t>figsize=(8, 6)</a:t>
+            </a:r>
+            <a:r>
+              <a:rPr kumimoji="0" lang="en-US" altLang="en-US" sz="800" b="0" i="0" u="none" strike="noStrike" cap="none" normalizeH="0" baseline="0">
+                <a:ln>
+                  <a:noFill/>
+                </a:ln>
+                <a:solidFill>
+                  <a:schemeClr val="tx1"/>
+                </a:solidFill>
+                <a:effectLst/>
+              </a:rPr>
+              <a:t> </a:t>
+            </a:r>
+            <a:endParaRPr kumimoji="0" lang="en-US" altLang="en-US" sz="1800" b="0" i="0" u="none" strike="noStrike" cap="none" normalizeH="0" baseline="0">
+              <a:ln>
+                <a:noFill/>
+              </a:ln>
+              <a:solidFill>
+                <a:schemeClr val="tx1"/>
+              </a:solidFill>
+              <a:effectLst/>
+              <a:latin typeface="Arial" panose="020B0604020202020204" pitchFamily="34" charset="0"/>
+            </a:endParaRPr>
+          </a:p>
+        </p:txBody>
+      </p:sp>
+      <p:sp>
+        <p:nvSpPr>
+          <p:cNvPr id="5" name="Rectangle 1">
+            <a:extLst>
+              <a:ext uri="{FF2B5EF4-FFF2-40B4-BE49-F238E27FC236}">
+                <a16:creationId xmlns:a16="http://schemas.microsoft.com/office/drawing/2014/main" id="{12452F51-75D1-4BF7-A190-00989342FF2B}"/>
+              </a:ext>
+            </a:extLst>
+          </p:cNvPr>
+          <p:cNvSpPr>
+            <a:spLocks noChangeArrowheads="1"/>
+          </p:cNvSpPr>
+          <p:nvPr/>
+        </p:nvSpPr>
+        <p:spPr bwMode="auto">
+          <a:xfrm>
+            <a:off x="152400" y="152400"/>
+            <a:ext cx="12192000" cy="457200"/>
+          </a:xfrm>
+          <a:prstGeom prst="rect">
+            <a:avLst/>
+          </a:prstGeom>
+          <a:noFill/>
+          <a:ln>
+            <a:noFill/>
+          </a:ln>
+          <a:effectLst/>
+          <a:extLst>
+            <a:ext uri="{909E8E84-426E-40DD-AFC4-6F175D3DCCD1}">
+              <a14:hiddenFill xmlns:a14="http://schemas.microsoft.com/office/drawing/2010/main">
+                <a:solidFill>
+                  <a:schemeClr val="accent1"/>
+                </a:solidFill>
+              </a14:hiddenFill>
+            </a:ext>
+            <a:ext uri="{91240B29-F687-4F45-9708-019B960494DF}">
+              <a14:hiddenLine xmlns:a14="http://schemas.microsoft.com/office/drawing/2010/main" w="9525">
+                <a:solidFill>
+                  <a:schemeClr val="tx1"/>
+                </a:solidFill>
+                <a:miter lim="800000"/>
+                <a:headEnd/>
+                <a:tailEnd/>
+              </a14:hiddenLine>
+            </a:ext>
+            <a:ext uri="{AF507438-7753-43E0-B8FC-AC1667EBCBE1}">
+              <a14:hiddenEffects xmlns:a14="http://schemas.microsoft.com/office/drawing/2010/main">
+                <a:effectLst>
+                  <a:outerShdw dist="35921" dir="2700000" algn="ctr" rotWithShape="0">
+                    <a:schemeClr val="bg2"/>
+                  </a:outerShdw>
+                </a:effectLst>
+              </a14:hiddenEffects>
+            </a:ext>
+          </a:extLst>
+        </p:spPr>
+        <p:txBody>
+          <a:bodyPr vert="horz" wrap="none" lIns="0" tIns="0" rIns="0" bIns="0" numCol="1" anchor="ctr" anchorCtr="0" compatLnSpc="1">
+            <a:prstTxWarp prst="textNoShape">
+              <a:avLst/>
+            </a:prstTxWarp>
+            <a:spAutoFit/>
+          </a:bodyPr>
+          <a:lstStyle/>
+          <a:p>
+            <a:pPr marL="0" marR="0" lvl="0" indent="0" algn="l" defTabSz="914400" rtl="0" eaLnBrk="0" fontAlgn="base" latinLnBrk="0" hangingPunct="0">
+              <a:lnSpc>
+                <a:spcPct val="100000"/>
+              </a:lnSpc>
+              <a:spcBef>
+                <a:spcPct val="0"/>
+              </a:spcBef>
+              <a:spcAft>
+                <a:spcPct val="0"/>
+              </a:spcAft>
+              <a:buClrTx/>
+              <a:buSzTx/>
+              <a:buFontTx/>
+              <a:buNone/>
+              <a:tabLst/>
+            </a:pPr>
+            <a:r>
+              <a:rPr kumimoji="0" lang="en-US" altLang="en-US" sz="900" b="0" i="0" u="none" strike="noStrike" cap="none" normalizeH="0" baseline="0">
+                <a:ln>
+                  <a:noFill/>
+                </a:ln>
+                <a:solidFill>
+                  <a:schemeClr val="tx1"/>
+                </a:solidFill>
+                <a:effectLst/>
+                <a:latin typeface="Arial Unicode MS"/>
+                <a:ea typeface="inherit"/>
+              </a:rPr>
+              <a:t>figsize=(8, 6)</a:t>
+            </a:r>
+            <a:r>
+              <a:rPr kumimoji="0" lang="en-US" altLang="en-US" sz="800" b="0" i="0" u="none" strike="noStrike" cap="none" normalizeH="0" baseline="0">
+                <a:ln>
+                  <a:noFill/>
+                </a:ln>
+                <a:solidFill>
+                  <a:schemeClr val="tx1"/>
+                </a:solidFill>
+                <a:effectLst/>
+              </a:rPr>
+              <a:t> </a:t>
+            </a:r>
+            <a:endParaRPr kumimoji="0" lang="en-US" altLang="en-US" sz="1800" b="0" i="0" u="none" strike="noStrike" cap="none" normalizeH="0" baseline="0">
+              <a:ln>
+                <a:noFill/>
+              </a:ln>
+              <a:solidFill>
+                <a:schemeClr val="tx1"/>
+              </a:solidFill>
+              <a:effectLst/>
+              <a:latin typeface="Arial" panose="020B0604020202020204" pitchFamily="34" charset="0"/>
+            </a:endParaRPr>
+          </a:p>
+        </p:txBody>
+      </p:sp>
+    </p:spTree>
+    <p:extLst>
+      <p:ext uri="{BB962C8B-B14F-4D97-AF65-F5344CB8AC3E}">
+        <p14:creationId xmlns:p14="http://schemas.microsoft.com/office/powerpoint/2010/main" val="83453457"/>
+      </p:ext>
+    </p:extLst>
+  </p:cSld>
+  <p:clrMapOvr>
+    <a:masterClrMapping/>
+  </p:clrMapOvr>
+</p:sld>
+</file>
+
+<file path=ppt/slides/slide20.xml><?xml version="1.0" encoding="utf-8"?>
+<p:sld xmlns:a="http://schemas.openxmlformats.org/drawingml/2006/main" xmlns:r="http://schemas.openxmlformats.org/officeDocument/2006/relationships" xmlns:p="http://schemas.openxmlformats.org/presentationml/2006/main">
+  <p:cSld>
+    <p:spTree>
+      <p:nvGrpSpPr>
+        <p:cNvPr id="1" name=""/>
+        <p:cNvGrpSpPr/>
+        <p:nvPr/>
+      </p:nvGrpSpPr>
+      <p:grpSpPr>
+        <a:xfrm>
+          <a:off x="0" y="0"/>
+          <a:ext cx="0" cy="0"/>
+          <a:chOff x="0" y="0"/>
+          <a:chExt cx="0" cy="0"/>
+        </a:xfrm>
+      </p:grpSpPr>
+      <p:sp>
+        <p:nvSpPr>
+          <p:cNvPr id="2" name="Title 1">
+            <a:extLst>
+              <a:ext uri="{FF2B5EF4-FFF2-40B4-BE49-F238E27FC236}">
+                <a16:creationId xmlns:a16="http://schemas.microsoft.com/office/drawing/2014/main" id="{D3D7B1E1-ADC6-44D4-BDCE-E76561BF2440}"/>
+              </a:ext>
+            </a:extLst>
+          </p:cNvPr>
+          <p:cNvSpPr>
+            <a:spLocks noGrp="1"/>
+          </p:cNvSpPr>
+          <p:nvPr>
+            <p:ph type="title"/>
+          </p:nvPr>
+        </p:nvSpPr>
+        <p:spPr/>
+        <p:txBody>
+          <a:bodyPr/>
+          <a:lstStyle/>
+          <a:p>
+            <a:r>
+              <a:rPr lang="en-US" dirty="0"/>
+              <a:t>Trained rec_noise2.2; threshold 0.6 VS 0.8; round 0</a:t>
+            </a:r>
+          </a:p>
+        </p:txBody>
+      </p:sp>
+      <p:sp>
+        <p:nvSpPr>
+          <p:cNvPr id="8" name="TextBox 7">
+            <a:extLst>
+              <a:ext uri="{FF2B5EF4-FFF2-40B4-BE49-F238E27FC236}">
+                <a16:creationId xmlns:a16="http://schemas.microsoft.com/office/drawing/2014/main" id="{24B69FAC-1BBE-493C-BFA2-B794B215E35E}"/>
+              </a:ext>
+            </a:extLst>
+          </p:cNvPr>
+          <p:cNvSpPr txBox="1"/>
+          <p:nvPr/>
+        </p:nvSpPr>
+        <p:spPr>
+          <a:xfrm>
+            <a:off x="8495930" y="2112885"/>
+            <a:ext cx="2467993" cy="3416320"/>
+          </a:xfrm>
+          <a:prstGeom prst="rect">
+            <a:avLst/>
+          </a:prstGeom>
+          <a:noFill/>
+        </p:spPr>
+        <p:txBody>
+          <a:bodyPr wrap="square" rtlCol="0">
+            <a:spAutoFit/>
+          </a:bodyPr>
+          <a:lstStyle/>
+          <a:p>
+            <a:r>
+              <a:rPr lang="en-US" dirty="0"/>
+              <a:t>Threshold: 0.6</a:t>
+            </a:r>
+          </a:p>
+          <a:p>
+            <a:endParaRPr lang="en-US" dirty="0"/>
+          </a:p>
+          <a:p>
+            <a:endParaRPr lang="en-US" dirty="0"/>
+          </a:p>
+          <a:p>
+            <a:endParaRPr lang="en-US" dirty="0"/>
+          </a:p>
+          <a:p>
+            <a:endParaRPr lang="en-US" dirty="0"/>
+          </a:p>
+          <a:p>
+            <a:endParaRPr lang="en-US" dirty="0"/>
+          </a:p>
+          <a:p>
+            <a:endParaRPr lang="en-US" dirty="0"/>
+          </a:p>
+          <a:p>
+            <a:endParaRPr lang="en-US" dirty="0"/>
+          </a:p>
+          <a:p>
+            <a:r>
+              <a:rPr lang="en-US" dirty="0"/>
+              <a:t>Threshold: 0.8</a:t>
+            </a:r>
+          </a:p>
+        </p:txBody>
+      </p:sp>
+      <p:pic>
+        <p:nvPicPr>
+          <p:cNvPr id="4" name="Picture 3" descr="A picture containing line chart&#10;&#10;Description automatically generated">
+            <a:extLst>
+              <a:ext uri="{FF2B5EF4-FFF2-40B4-BE49-F238E27FC236}">
+                <a16:creationId xmlns:a16="http://schemas.microsoft.com/office/drawing/2014/main" id="{9DBC2C09-8291-4312-A464-4C7B06DB2104}"/>
+              </a:ext>
+            </a:extLst>
+          </p:cNvPr>
+          <p:cNvPicPr>
+            <a:picLocks noChangeAspect="1"/>
+          </p:cNvPicPr>
+          <p:nvPr/>
+        </p:nvPicPr>
+        <p:blipFill>
+          <a:blip r:embed="rId2">
+            <a:extLst>
+              <a:ext uri="{28A0092B-C50C-407E-A947-70E740481C1C}">
+                <a14:useLocalDpi xmlns:a14="http://schemas.microsoft.com/office/drawing/2010/main" val="0"/>
+              </a:ext>
+            </a:extLst>
+          </a:blip>
+          <a:stretch>
+            <a:fillRect/>
+          </a:stretch>
+        </p:blipFill>
+        <p:spPr>
+          <a:xfrm>
+            <a:off x="1343769" y="1328795"/>
+            <a:ext cx="7315200" cy="2813538"/>
+          </a:xfrm>
+          <a:prstGeom prst="rect">
+            <a:avLst/>
+          </a:prstGeom>
+        </p:spPr>
+      </p:pic>
+      <p:pic>
+        <p:nvPicPr>
+          <p:cNvPr id="9" name="Picture 8" descr="Chart, line chart&#10;&#10;Description automatically generated">
+            <a:extLst>
+              <a:ext uri="{FF2B5EF4-FFF2-40B4-BE49-F238E27FC236}">
+                <a16:creationId xmlns:a16="http://schemas.microsoft.com/office/drawing/2014/main" id="{84D74B9C-E0D5-436B-BAE0-CB498B625CC8}"/>
+              </a:ext>
+            </a:extLst>
+          </p:cNvPr>
+          <p:cNvPicPr>
+            <a:picLocks noChangeAspect="1"/>
+          </p:cNvPicPr>
+          <p:nvPr/>
+        </p:nvPicPr>
+        <p:blipFill>
+          <a:blip r:embed="rId3">
+            <a:extLst>
+              <a:ext uri="{28A0092B-C50C-407E-A947-70E740481C1C}">
+                <a14:useLocalDpi xmlns:a14="http://schemas.microsoft.com/office/drawing/2010/main" val="0"/>
+              </a:ext>
+            </a:extLst>
+          </a:blip>
+          <a:stretch>
+            <a:fillRect/>
+          </a:stretch>
+        </p:blipFill>
+        <p:spPr>
+          <a:xfrm>
+            <a:off x="1347010" y="3821045"/>
+            <a:ext cx="7315200" cy="2813538"/>
+          </a:xfrm>
+          <a:prstGeom prst="rect">
+            <a:avLst/>
+          </a:prstGeom>
+        </p:spPr>
+      </p:pic>
+    </p:spTree>
+    <p:extLst>
+      <p:ext uri="{BB962C8B-B14F-4D97-AF65-F5344CB8AC3E}">
+        <p14:creationId xmlns:p14="http://schemas.microsoft.com/office/powerpoint/2010/main" val="1328974904"/>
+      </p:ext>
+    </p:extLst>
+  </p:cSld>
+  <p:clrMapOvr>
+    <a:masterClrMapping/>
+  </p:clrMapOvr>
+</p:sld>
+</file>
+
+<file path=ppt/slides/slide21.xml><?xml version="1.0" encoding="utf-8"?>
+<p:sld xmlns:a="http://schemas.openxmlformats.org/drawingml/2006/main" xmlns:r="http://schemas.openxmlformats.org/officeDocument/2006/relationships" xmlns:p="http://schemas.openxmlformats.org/presentationml/2006/main">
+  <p:cSld>
+    <p:spTree>
+      <p:nvGrpSpPr>
+        <p:cNvPr id="1" name=""/>
+        <p:cNvGrpSpPr/>
+        <p:nvPr/>
+      </p:nvGrpSpPr>
+      <p:grpSpPr>
+        <a:xfrm>
+          <a:off x="0" y="0"/>
+          <a:ext cx="0" cy="0"/>
+          <a:chOff x="0" y="0"/>
+          <a:chExt cx="0" cy="0"/>
+        </a:xfrm>
+      </p:grpSpPr>
+      <p:sp>
+        <p:nvSpPr>
+          <p:cNvPr id="2" name="Title 1">
+            <a:extLst>
+              <a:ext uri="{FF2B5EF4-FFF2-40B4-BE49-F238E27FC236}">
+                <a16:creationId xmlns:a16="http://schemas.microsoft.com/office/drawing/2014/main" id="{7F644D1A-0950-40F1-A893-C3253F1D62CD}"/>
+              </a:ext>
+            </a:extLst>
+          </p:cNvPr>
+          <p:cNvSpPr>
+            <a:spLocks noGrp="1"/>
+          </p:cNvSpPr>
+          <p:nvPr>
+            <p:ph type="title"/>
+          </p:nvPr>
+        </p:nvSpPr>
+        <p:spPr/>
+        <p:txBody>
+          <a:bodyPr/>
+          <a:lstStyle/>
+          <a:p>
+            <a:r>
+              <a:rPr lang="en-US" dirty="0"/>
+              <a:t>Trained </a:t>
+            </a:r>
+            <a:r>
+              <a:rPr lang="en-US" dirty="0" err="1"/>
+              <a:t>rec_noise</a:t>
+            </a:r>
+            <a:r>
+              <a:rPr lang="en-US" dirty="0"/>
+              <a:t> 2.2; threshold 0.7; round 1</a:t>
+            </a:r>
+          </a:p>
+        </p:txBody>
+      </p:sp>
+      <p:pic>
+        <p:nvPicPr>
+          <p:cNvPr id="4" name="Picture 3" descr="A picture containing shape&#10;&#10;Description automatically generated">
+            <a:extLst>
+              <a:ext uri="{FF2B5EF4-FFF2-40B4-BE49-F238E27FC236}">
+                <a16:creationId xmlns:a16="http://schemas.microsoft.com/office/drawing/2014/main" id="{F41D3B2D-BBFA-4041-86AC-38221372B94C}"/>
+              </a:ext>
+            </a:extLst>
+          </p:cNvPr>
+          <p:cNvPicPr>
+            <a:picLocks noChangeAspect="1"/>
+          </p:cNvPicPr>
+          <p:nvPr/>
+        </p:nvPicPr>
+        <p:blipFill>
+          <a:blip r:embed="rId2">
+            <a:extLst>
+              <a:ext uri="{28A0092B-C50C-407E-A947-70E740481C1C}">
+                <a14:useLocalDpi xmlns:a14="http://schemas.microsoft.com/office/drawing/2010/main" val="0"/>
+              </a:ext>
+            </a:extLst>
+          </a:blip>
+          <a:stretch>
+            <a:fillRect/>
+          </a:stretch>
+        </p:blipFill>
+        <p:spPr>
+          <a:xfrm>
+            <a:off x="153143" y="1143286"/>
+            <a:ext cx="11885714" cy="4571428"/>
+          </a:xfrm>
+          <a:prstGeom prst="rect">
+            <a:avLst/>
+          </a:prstGeom>
+        </p:spPr>
+      </p:pic>
+    </p:spTree>
+    <p:extLst>
+      <p:ext uri="{BB962C8B-B14F-4D97-AF65-F5344CB8AC3E}">
+        <p14:creationId xmlns:p14="http://schemas.microsoft.com/office/powerpoint/2010/main" val="2741987749"/>
+      </p:ext>
+    </p:extLst>
+  </p:cSld>
+  <p:clrMapOvr>
+    <a:masterClrMapping/>
+  </p:clrMapOvr>
+</p:sld>
+</file>
+
+<file path=ppt/slides/slide22.xml><?xml version="1.0" encoding="utf-8"?>
+<p:sld xmlns:a="http://schemas.openxmlformats.org/drawingml/2006/main" xmlns:r="http://schemas.openxmlformats.org/officeDocument/2006/relationships" xmlns:p="http://schemas.openxmlformats.org/presentationml/2006/main">
+  <p:cSld>
+    <p:spTree>
+      <p:nvGrpSpPr>
+        <p:cNvPr id="1" name=""/>
+        <p:cNvGrpSpPr/>
+        <p:nvPr/>
+      </p:nvGrpSpPr>
+      <p:grpSpPr>
+        <a:xfrm>
+          <a:off x="0" y="0"/>
+          <a:ext cx="0" cy="0"/>
+          <a:chOff x="0" y="0"/>
+          <a:chExt cx="0" cy="0"/>
+        </a:xfrm>
+      </p:grpSpPr>
+      <p:sp>
+        <p:nvSpPr>
+          <p:cNvPr id="2" name="Title 1">
+            <a:extLst>
+              <a:ext uri="{FF2B5EF4-FFF2-40B4-BE49-F238E27FC236}">
+                <a16:creationId xmlns:a16="http://schemas.microsoft.com/office/drawing/2014/main" id="{D3D7B1E1-ADC6-44D4-BDCE-E76561BF2440}"/>
+              </a:ext>
+            </a:extLst>
+          </p:cNvPr>
+          <p:cNvSpPr>
+            <a:spLocks noGrp="1"/>
+          </p:cNvSpPr>
+          <p:nvPr>
+            <p:ph type="title"/>
+          </p:nvPr>
+        </p:nvSpPr>
+        <p:spPr/>
+        <p:txBody>
+          <a:bodyPr/>
+          <a:lstStyle/>
+          <a:p>
+            <a:r>
+              <a:rPr lang="en-US" dirty="0"/>
+              <a:t>Trained rec_noise2.2; threshold 0.6 VS 0.8; round 1</a:t>
+            </a:r>
+          </a:p>
+        </p:txBody>
+      </p:sp>
+      <p:sp>
+        <p:nvSpPr>
+          <p:cNvPr id="8" name="TextBox 7">
+            <a:extLst>
+              <a:ext uri="{FF2B5EF4-FFF2-40B4-BE49-F238E27FC236}">
+                <a16:creationId xmlns:a16="http://schemas.microsoft.com/office/drawing/2014/main" id="{24B69FAC-1BBE-493C-BFA2-B794B215E35E}"/>
+              </a:ext>
+            </a:extLst>
+          </p:cNvPr>
+          <p:cNvSpPr txBox="1"/>
+          <p:nvPr/>
+        </p:nvSpPr>
+        <p:spPr>
+          <a:xfrm>
+            <a:off x="8495930" y="2112885"/>
+            <a:ext cx="2467993" cy="3416320"/>
+          </a:xfrm>
+          <a:prstGeom prst="rect">
+            <a:avLst/>
+          </a:prstGeom>
+          <a:noFill/>
+        </p:spPr>
+        <p:txBody>
+          <a:bodyPr wrap="square" rtlCol="0">
+            <a:spAutoFit/>
+          </a:bodyPr>
+          <a:lstStyle/>
+          <a:p>
+            <a:r>
+              <a:rPr lang="en-US" dirty="0"/>
+              <a:t>Threshold: 0.6</a:t>
+            </a:r>
+          </a:p>
+          <a:p>
+            <a:endParaRPr lang="en-US" dirty="0"/>
+          </a:p>
+          <a:p>
+            <a:endParaRPr lang="en-US" dirty="0"/>
+          </a:p>
+          <a:p>
+            <a:endParaRPr lang="en-US" dirty="0"/>
+          </a:p>
+          <a:p>
+            <a:endParaRPr lang="en-US" dirty="0"/>
+          </a:p>
+          <a:p>
+            <a:endParaRPr lang="en-US" dirty="0"/>
+          </a:p>
+          <a:p>
+            <a:endParaRPr lang="en-US" dirty="0"/>
+          </a:p>
+          <a:p>
+            <a:endParaRPr lang="en-US" dirty="0"/>
+          </a:p>
+          <a:p>
+            <a:r>
+              <a:rPr lang="en-US" dirty="0"/>
+              <a:t>Threshold: 0.8</a:t>
+            </a:r>
+          </a:p>
+        </p:txBody>
+      </p:sp>
+      <p:pic>
+        <p:nvPicPr>
+          <p:cNvPr id="4" name="Picture 3" descr="A picture containing shape&#10;&#10;Description automatically generated">
+            <a:extLst>
+              <a:ext uri="{FF2B5EF4-FFF2-40B4-BE49-F238E27FC236}">
+                <a16:creationId xmlns:a16="http://schemas.microsoft.com/office/drawing/2014/main" id="{E6D13130-7489-44EA-B9F8-212F7B295BD9}"/>
+              </a:ext>
+            </a:extLst>
+          </p:cNvPr>
+          <p:cNvPicPr>
+            <a:picLocks noChangeAspect="1"/>
+          </p:cNvPicPr>
+          <p:nvPr/>
+        </p:nvPicPr>
+        <p:blipFill>
+          <a:blip r:embed="rId2">
+            <a:extLst>
+              <a:ext uri="{28A0092B-C50C-407E-A947-70E740481C1C}">
+                <a14:useLocalDpi xmlns:a14="http://schemas.microsoft.com/office/drawing/2010/main" val="0"/>
+              </a:ext>
+            </a:extLst>
+          </a:blip>
+          <a:stretch>
+            <a:fillRect/>
+          </a:stretch>
+        </p:blipFill>
+        <p:spPr>
+          <a:xfrm>
+            <a:off x="1180730" y="1205430"/>
+            <a:ext cx="7315200" cy="2813538"/>
+          </a:xfrm>
+          <a:prstGeom prst="rect">
+            <a:avLst/>
+          </a:prstGeom>
+        </p:spPr>
+      </p:pic>
+      <p:pic>
+        <p:nvPicPr>
+          <p:cNvPr id="9" name="Picture 8" descr="Chart, line chart&#10;&#10;Description automatically generated">
+            <a:extLst>
+              <a:ext uri="{FF2B5EF4-FFF2-40B4-BE49-F238E27FC236}">
+                <a16:creationId xmlns:a16="http://schemas.microsoft.com/office/drawing/2014/main" id="{25DBCAF9-3042-4FA6-A8FD-1872BF8824DD}"/>
+              </a:ext>
+            </a:extLst>
+          </p:cNvPr>
+          <p:cNvPicPr>
+            <a:picLocks noChangeAspect="1"/>
+          </p:cNvPicPr>
+          <p:nvPr/>
+        </p:nvPicPr>
+        <p:blipFill>
+          <a:blip r:embed="rId3">
+            <a:extLst>
+              <a:ext uri="{28A0092B-C50C-407E-A947-70E740481C1C}">
+                <a14:useLocalDpi xmlns:a14="http://schemas.microsoft.com/office/drawing/2010/main" val="0"/>
+              </a:ext>
+            </a:extLst>
+          </a:blip>
+          <a:stretch>
+            <a:fillRect/>
+          </a:stretch>
+        </p:blipFill>
+        <p:spPr>
+          <a:xfrm>
+            <a:off x="1180730" y="3821045"/>
+            <a:ext cx="7315200" cy="2813538"/>
+          </a:xfrm>
+          <a:prstGeom prst="rect">
+            <a:avLst/>
+          </a:prstGeom>
+        </p:spPr>
+      </p:pic>
+    </p:spTree>
+    <p:extLst>
+      <p:ext uri="{BB962C8B-B14F-4D97-AF65-F5344CB8AC3E}">
+        <p14:creationId xmlns:p14="http://schemas.microsoft.com/office/powerpoint/2010/main" val="1546247422"/>
+      </p:ext>
+    </p:extLst>
+  </p:cSld>
+  <p:clrMapOvr>
+    <a:masterClrMapping/>
+  </p:clrMapOvr>
+</p:sld>
+</file>
+
+<file path=ppt/slides/slide23.xml><?xml version="1.0" encoding="utf-8"?>
+<p:sld xmlns:a="http://schemas.openxmlformats.org/drawingml/2006/main" xmlns:r="http://schemas.openxmlformats.org/officeDocument/2006/relationships" xmlns:p="http://schemas.openxmlformats.org/presentationml/2006/main">
+  <p:cSld>
+    <p:spTree>
+      <p:nvGrpSpPr>
+        <p:cNvPr id="1" name=""/>
+        <p:cNvGrpSpPr/>
+        <p:nvPr/>
+      </p:nvGrpSpPr>
+      <p:grpSpPr>
+        <a:xfrm>
+          <a:off x="0" y="0"/>
+          <a:ext cx="0" cy="0"/>
+          <a:chOff x="0" y="0"/>
+          <a:chExt cx="0" cy="0"/>
+        </a:xfrm>
+      </p:grpSpPr>
+      <p:sp>
+        <p:nvSpPr>
+          <p:cNvPr id="2" name="Title 1">
+            <a:extLst>
+              <a:ext uri="{FF2B5EF4-FFF2-40B4-BE49-F238E27FC236}">
+                <a16:creationId xmlns:a16="http://schemas.microsoft.com/office/drawing/2014/main" id="{5DE38396-7892-4682-A4FD-064AA2166794}"/>
+              </a:ext>
+            </a:extLst>
+          </p:cNvPr>
+          <p:cNvSpPr>
+            <a:spLocks noGrp="1"/>
+          </p:cNvSpPr>
+          <p:nvPr>
+            <p:ph type="title"/>
+          </p:nvPr>
+        </p:nvSpPr>
+        <p:spPr/>
+        <p:txBody>
+          <a:bodyPr/>
+          <a:lstStyle/>
+          <a:p>
+            <a:r>
+              <a:rPr lang="en-US" dirty="0"/>
+              <a:t>Summary</a:t>
+            </a:r>
+          </a:p>
+        </p:txBody>
+      </p:sp>
+      <p:sp>
+        <p:nvSpPr>
+          <p:cNvPr id="3" name="Content Placeholder 2">
+            <a:extLst>
+              <a:ext uri="{FF2B5EF4-FFF2-40B4-BE49-F238E27FC236}">
+                <a16:creationId xmlns:a16="http://schemas.microsoft.com/office/drawing/2014/main" id="{4E1D906D-72FA-4F21-BC6C-9AD0B4E5BB62}"/>
+              </a:ext>
+            </a:extLst>
+          </p:cNvPr>
+          <p:cNvSpPr>
+            <a:spLocks noGrp="1"/>
+          </p:cNvSpPr>
+          <p:nvPr>
+            <p:ph idx="1"/>
+          </p:nvPr>
+        </p:nvSpPr>
+        <p:spPr>
+          <a:xfrm>
+            <a:off x="838200" y="1803399"/>
+            <a:ext cx="10515600" cy="4455357"/>
+          </a:xfrm>
+        </p:spPr>
+        <p:txBody>
+          <a:bodyPr/>
+          <a:lstStyle/>
+          <a:p>
+            <a:r>
+              <a:rPr lang="en-US" sz="2400" dirty="0"/>
+              <a:t>For low </a:t>
+            </a:r>
+            <a:r>
+              <a:rPr lang="en-US" sz="2400" dirty="0" err="1"/>
+              <a:t>rec_noise</a:t>
+            </a:r>
+            <a:r>
+              <a:rPr lang="en-US" sz="2400" dirty="0"/>
+              <a:t>, increase the threshold will cause almost all trials out of task time; decrease the threshold doesn’t have a significant effect </a:t>
+            </a:r>
+          </a:p>
+          <a:p>
+            <a:r>
+              <a:rPr lang="en-US" sz="2400" dirty="0"/>
+              <a:t>For high </a:t>
+            </a:r>
+            <a:r>
+              <a:rPr lang="en-US" sz="2400" dirty="0" err="1"/>
+              <a:t>rec_noise</a:t>
+            </a:r>
+            <a:r>
+              <a:rPr lang="en-US" sz="2400" dirty="0"/>
+              <a:t>, slow decision models have similar performance as low </a:t>
+            </a:r>
+            <a:r>
+              <a:rPr lang="en-US" sz="2400" dirty="0" err="1"/>
+              <a:t>rec_noises</a:t>
+            </a:r>
+            <a:endParaRPr lang="en-US" sz="2400" dirty="0"/>
+          </a:p>
+          <a:p>
+            <a:r>
+              <a:rPr lang="en-US" sz="2400" dirty="0"/>
+              <a:t>For fast decision model, changes in threshold slightly decrease the performance </a:t>
+            </a:r>
+          </a:p>
+          <a:p>
+            <a:pPr lvl="1"/>
+            <a:r>
+              <a:rPr lang="en-US" sz="2000" dirty="0"/>
+              <a:t>Increase threshold: decision fluctuation induced by the noise will make correct choices reach the threshold </a:t>
+            </a:r>
+          </a:p>
+          <a:p>
+            <a:pPr lvl="1"/>
+            <a:r>
+              <a:rPr lang="en-US" sz="2000" dirty="0"/>
+              <a:t>Decrease threshold: decision fluctuation induced by the noise will make wrong choices reach the threshold   </a:t>
+            </a:r>
+          </a:p>
+          <a:p>
+            <a:r>
+              <a:rPr lang="en-US" sz="2400" dirty="0"/>
+              <a:t>When </a:t>
+            </a:r>
+            <a:r>
+              <a:rPr lang="en-US" sz="2400" dirty="0" err="1"/>
+              <a:t>rec_noise</a:t>
+            </a:r>
+            <a:r>
+              <a:rPr lang="en-US" sz="2400" dirty="0"/>
+              <a:t> is high enough, there is no longer fast model trained</a:t>
+            </a:r>
+          </a:p>
+        </p:txBody>
+      </p:sp>
+    </p:spTree>
+    <p:extLst>
+      <p:ext uri="{BB962C8B-B14F-4D97-AF65-F5344CB8AC3E}">
+        <p14:creationId xmlns:p14="http://schemas.microsoft.com/office/powerpoint/2010/main" val="3348622923"/>
+      </p:ext>
+    </p:extLst>
+  </p:cSld>
+  <p:clrMapOvr>
+    <a:masterClrMapping/>
+  </p:clrMapOvr>
+</p:sld>
+</file>
+
+<file path=ppt/slides/slide24.xml><?xml version="1.0" encoding="utf-8"?>
 <p:sld xmlns:a="http://schemas.openxmlformats.org/drawingml/2006/main" xmlns:r="http://schemas.openxmlformats.org/officeDocument/2006/relationships" xmlns:p="http://schemas.openxmlformats.org/presentationml/2006/main">
   <p:cSld>
     <p:spTree>
@@ -18852,7 +21228,7 @@
 </p:sld>
 </file>
 
-<file path=ppt/slides/slide15.xml><?xml version="1.0" encoding="utf-8"?>
+<file path=ppt/slides/slide25.xml><?xml version="1.0" encoding="utf-8"?>
 <p:sld xmlns:a="http://schemas.openxmlformats.org/drawingml/2006/main" xmlns:r="http://schemas.openxmlformats.org/officeDocument/2006/relationships" xmlns:p="http://schemas.openxmlformats.org/presentationml/2006/main">
   <p:cSld>
     <p:spTree>
@@ -19319,7 +21695,7 @@
 </p:sld>
 </file>
 
-<file path=ppt/slides/slide16.xml><?xml version="1.0" encoding="utf-8"?>
+<file path=ppt/slides/slide26.xml><?xml version="1.0" encoding="utf-8"?>
 <p:sld xmlns:a="http://schemas.openxmlformats.org/drawingml/2006/main" xmlns:r="http://schemas.openxmlformats.org/officeDocument/2006/relationships" xmlns:p="http://schemas.openxmlformats.org/presentationml/2006/main">
   <p:cSld>
     <p:spTree>
@@ -20485,7 +22861,7 @@
 </p:sld>
 </file>
 
-<file path=ppt/slides/slide17.xml><?xml version="1.0" encoding="utf-8"?>
+<file path=ppt/slides/slide27.xml><?xml version="1.0" encoding="utf-8"?>
 <p:sld xmlns:a="http://schemas.openxmlformats.org/drawingml/2006/main" xmlns:r="http://schemas.openxmlformats.org/officeDocument/2006/relationships" xmlns:p="http://schemas.openxmlformats.org/presentationml/2006/main">
   <p:cSld>
     <p:spTree>
@@ -21697,945 +24073,6 @@
     <p:extLst>
       <p:ext uri="{BB962C8B-B14F-4D97-AF65-F5344CB8AC3E}">
         <p14:creationId xmlns:p14="http://schemas.microsoft.com/office/powerpoint/2010/main" val="2332291537"/>
-      </p:ext>
-    </p:extLst>
-  </p:cSld>
-  <p:clrMapOvr>
-    <a:masterClrMapping/>
-  </p:clrMapOvr>
-</p:sld>
-</file>
-
-<file path=ppt/slides/slide2.xml><?xml version="1.0" encoding="utf-8"?>
-<p:sld xmlns:a="http://schemas.openxmlformats.org/drawingml/2006/main" xmlns:r="http://schemas.openxmlformats.org/officeDocument/2006/relationships" xmlns:p="http://schemas.openxmlformats.org/presentationml/2006/main">
-  <p:cSld>
-    <p:spTree>
-      <p:nvGrpSpPr>
-        <p:cNvPr id="1" name=""/>
-        <p:cNvGrpSpPr/>
-        <p:nvPr/>
-      </p:nvGrpSpPr>
-      <p:grpSpPr>
-        <a:xfrm>
-          <a:off x="0" y="0"/>
-          <a:ext cx="0" cy="0"/>
-          <a:chOff x="0" y="0"/>
-          <a:chExt cx="0" cy="0"/>
-        </a:xfrm>
-      </p:grpSpPr>
-      <p:sp>
-        <p:nvSpPr>
-          <p:cNvPr id="2" name="Title 1">
-            <a:extLst>
-              <a:ext uri="{FF2B5EF4-FFF2-40B4-BE49-F238E27FC236}">
-                <a16:creationId xmlns:a16="http://schemas.microsoft.com/office/drawing/2014/main" id="{C3C6F60E-9C9E-45C3-A3D6-6467A1426616}"/>
-              </a:ext>
-            </a:extLst>
-          </p:cNvPr>
-          <p:cNvSpPr>
-            <a:spLocks noGrp="1"/>
-          </p:cNvSpPr>
-          <p:nvPr>
-            <p:ph type="title"/>
-          </p:nvPr>
-        </p:nvSpPr>
-        <p:spPr/>
-        <p:txBody>
-          <a:bodyPr/>
-          <a:lstStyle/>
-          <a:p>
-            <a:r>
-              <a:rPr lang="en-US" dirty="0"/>
-              <a:t>Basic model</a:t>
-            </a:r>
-          </a:p>
-        </p:txBody>
-      </p:sp>
-      <mc:AlternateContent xmlns:mc="http://schemas.openxmlformats.org/markup-compatibility/2006" xmlns:a14="http://schemas.microsoft.com/office/drawing/2010/main">
-        <mc:Choice Requires="a14">
-          <p:sp>
-            <p:nvSpPr>
-              <p:cNvPr id="3" name="Content Placeholder 2">
-                <a:extLst>
-                  <a:ext uri="{FF2B5EF4-FFF2-40B4-BE49-F238E27FC236}">
-                    <a16:creationId xmlns:a16="http://schemas.microsoft.com/office/drawing/2014/main" id="{7F9BF9D3-0A5C-4893-8395-03C903430E93}"/>
-                  </a:ext>
-                </a:extLst>
-              </p:cNvPr>
-              <p:cNvSpPr>
-                <a:spLocks noGrp="1"/>
-              </p:cNvSpPr>
-              <p:nvPr>
-                <p:ph idx="1"/>
-              </p:nvPr>
-            </p:nvSpPr>
-            <p:spPr/>
-            <p:txBody>
-              <a:bodyPr/>
-              <a:lstStyle/>
-              <a:p>
-                <a14:m>
-                  <m:oMath xmlns:m="http://schemas.openxmlformats.org/officeDocument/2006/math">
-                    <m:sSub>
-                      <m:sSubPr>
-                        <m:ctrlPr>
-                          <a:rPr lang="en-US" i="1" smtClean="0">
-                            <a:latin typeface="Cambria Math" panose="02040503050406030204" pitchFamily="18" charset="0"/>
-                          </a:rPr>
-                        </m:ctrlPr>
-                      </m:sSubPr>
-                      <m:e>
-                        <m:r>
-                          <a:rPr lang="en-US" b="0" i="1" smtClean="0">
-                            <a:latin typeface="Cambria Math" panose="02040503050406030204" pitchFamily="18" charset="0"/>
-                          </a:rPr>
-                          <m:t>𝑥</m:t>
-                        </m:r>
-                      </m:e>
-                      <m:sub>
-                        <m:r>
-                          <a:rPr lang="en-US" b="0" i="1" smtClean="0">
-                            <a:latin typeface="Cambria Math" panose="02040503050406030204" pitchFamily="18" charset="0"/>
-                          </a:rPr>
-                          <m:t>𝑡</m:t>
-                        </m:r>
-                        <m:r>
-                          <a:rPr lang="en-US" b="0" i="1" smtClean="0">
-                            <a:latin typeface="Cambria Math" panose="02040503050406030204" pitchFamily="18" charset="0"/>
-                          </a:rPr>
-                          <m:t>+1</m:t>
-                        </m:r>
-                      </m:sub>
-                    </m:sSub>
-                    <m:r>
-                      <a:rPr lang="en-US" i="1" smtClean="0">
-                        <a:latin typeface="Cambria Math" panose="02040503050406030204" pitchFamily="18" charset="0"/>
-                      </a:rPr>
-                      <m:t>=</m:t>
-                    </m:r>
-                  </m:oMath>
-                </a14:m>
-                <a:r>
-                  <a:rPr lang="en-US" dirty="0"/>
-                  <a:t> </a:t>
-                </a:r>
-                <a14:m>
-                  <m:oMath xmlns:m="http://schemas.openxmlformats.org/officeDocument/2006/math">
-                    <m:d>
-                      <m:dPr>
-                        <m:ctrlPr>
-                          <a:rPr lang="en-US" b="0" i="1" smtClean="0">
-                            <a:latin typeface="Cambria Math" panose="02040503050406030204" pitchFamily="18" charset="0"/>
-                          </a:rPr>
-                        </m:ctrlPr>
-                      </m:dPr>
-                      <m:e>
-                        <m:r>
-                          <a:rPr lang="en-US" b="0" i="0" smtClean="0">
-                            <a:latin typeface="Cambria Math" panose="02040503050406030204" pitchFamily="18" charset="0"/>
-                          </a:rPr>
-                          <m:t>1−</m:t>
-                        </m:r>
-                        <m:r>
-                          <m:rPr>
-                            <m:sty m:val="p"/>
-                          </m:rPr>
-                          <a:rPr lang="el-GR" b="0" i="1" smtClean="0">
-                            <a:latin typeface="Cambria Math" panose="02040503050406030204" pitchFamily="18" charset="0"/>
-                          </a:rPr>
-                          <m:t>α</m:t>
-                        </m:r>
-                      </m:e>
-                    </m:d>
-                    <m:r>
-                      <a:rPr lang="en-US" b="0" i="0" smtClean="0">
-                        <a:latin typeface="Cambria Math" panose="02040503050406030204" pitchFamily="18" charset="0"/>
-                      </a:rPr>
-                      <m:t>∗</m:t>
-                    </m:r>
-                    <m:sSub>
-                      <m:sSubPr>
-                        <m:ctrlPr>
-                          <a:rPr lang="en-US" i="1">
-                            <a:latin typeface="Cambria Math" panose="02040503050406030204" pitchFamily="18" charset="0"/>
-                          </a:rPr>
-                        </m:ctrlPr>
-                      </m:sSubPr>
-                      <m:e>
-                        <m:r>
-                          <a:rPr lang="en-US" i="1">
-                            <a:latin typeface="Cambria Math" panose="02040503050406030204" pitchFamily="18" charset="0"/>
-                          </a:rPr>
-                          <m:t>𝑥</m:t>
-                        </m:r>
-                      </m:e>
-                      <m:sub>
-                        <m:r>
-                          <a:rPr lang="en-US" i="1">
-                            <a:latin typeface="Cambria Math" panose="02040503050406030204" pitchFamily="18" charset="0"/>
-                          </a:rPr>
-                          <m:t>𝑡</m:t>
-                        </m:r>
-                      </m:sub>
-                    </m:sSub>
-                    <m:r>
-                      <a:rPr lang="en-US" b="0" i="1" smtClean="0">
-                        <a:latin typeface="Cambria Math" panose="02040503050406030204" pitchFamily="18" charset="0"/>
-                      </a:rPr>
-                      <m:t>+</m:t>
-                    </m:r>
-                    <m:r>
-                      <m:rPr>
-                        <m:sty m:val="p"/>
-                      </m:rPr>
-                      <a:rPr lang="el-GR" b="0" i="1" smtClean="0">
-                        <a:latin typeface="Cambria Math" panose="02040503050406030204" pitchFamily="18" charset="0"/>
-                      </a:rPr>
-                      <m:t>α</m:t>
-                    </m:r>
-                    <m:r>
-                      <a:rPr lang="en-US" b="0" i="1" smtClean="0">
-                        <a:latin typeface="Cambria Math" panose="02040503050406030204" pitchFamily="18" charset="0"/>
-                      </a:rPr>
-                      <m:t>∗</m:t>
-                    </m:r>
-                    <m:d>
-                      <m:dPr>
-                        <m:ctrlPr>
-                          <a:rPr lang="en-US" b="0" i="1" smtClean="0">
-                            <a:latin typeface="Cambria Math" panose="02040503050406030204" pitchFamily="18" charset="0"/>
-                          </a:rPr>
-                        </m:ctrlPr>
-                      </m:dPr>
-                      <m:e>
-                        <m:sSup>
-                          <m:sSupPr>
-                            <m:ctrlPr>
-                              <a:rPr lang="en-US" b="0" i="1" smtClean="0">
-                                <a:latin typeface="Cambria Math" panose="02040503050406030204" pitchFamily="18" charset="0"/>
-                              </a:rPr>
-                            </m:ctrlPr>
-                          </m:sSupPr>
-                          <m:e>
-                            <m:r>
-                              <a:rPr lang="en-US" b="0" i="1" smtClean="0">
-                                <a:latin typeface="Cambria Math" panose="02040503050406030204" pitchFamily="18" charset="0"/>
-                              </a:rPr>
-                              <m:t>𝑊</m:t>
-                            </m:r>
-                          </m:e>
-                          <m:sup>
-                            <m:r>
-                              <a:rPr lang="en-US" b="0" i="1" smtClean="0">
-                                <a:latin typeface="Cambria Math" panose="02040503050406030204" pitchFamily="18" charset="0"/>
-                              </a:rPr>
-                              <m:t>𝑟𝑒𝑐</m:t>
-                            </m:r>
-                          </m:sup>
-                        </m:sSup>
-                        <m:r>
-                          <a:rPr lang="en-US" b="0" i="1" smtClean="0">
-                            <a:latin typeface="Cambria Math" panose="02040503050406030204" pitchFamily="18" charset="0"/>
-                          </a:rPr>
-                          <m:t>∗</m:t>
-                        </m:r>
-                        <m:r>
-                          <a:rPr lang="en-US" b="0" i="1" smtClean="0">
-                            <a:latin typeface="Cambria Math" panose="02040503050406030204" pitchFamily="18" charset="0"/>
-                          </a:rPr>
-                          <m:t>𝑟𝑒𝑙𝑢</m:t>
-                        </m:r>
-                        <m:d>
-                          <m:dPr>
-                            <m:ctrlPr>
-                              <a:rPr lang="en-US" b="0" i="1" smtClean="0">
-                                <a:latin typeface="Cambria Math" panose="02040503050406030204" pitchFamily="18" charset="0"/>
-                              </a:rPr>
-                            </m:ctrlPr>
-                          </m:dPr>
-                          <m:e>
-                            <m:sSub>
-                              <m:sSubPr>
-                                <m:ctrlPr>
-                                  <a:rPr lang="en-US" i="1">
-                                    <a:latin typeface="Cambria Math" panose="02040503050406030204" pitchFamily="18" charset="0"/>
-                                  </a:rPr>
-                                </m:ctrlPr>
-                              </m:sSubPr>
-                              <m:e>
-                                <m:r>
-                                  <a:rPr lang="en-US" i="1">
-                                    <a:latin typeface="Cambria Math" panose="02040503050406030204" pitchFamily="18" charset="0"/>
-                                  </a:rPr>
-                                  <m:t>𝑥</m:t>
-                                </m:r>
-                              </m:e>
-                              <m:sub>
-                                <m:r>
-                                  <a:rPr lang="en-US" i="1">
-                                    <a:latin typeface="Cambria Math" panose="02040503050406030204" pitchFamily="18" charset="0"/>
-                                  </a:rPr>
-                                  <m:t>𝑡</m:t>
-                                </m:r>
-                              </m:sub>
-                            </m:sSub>
-                          </m:e>
-                        </m:d>
-                        <m:r>
-                          <a:rPr lang="en-US" b="0" i="1" smtClean="0">
-                            <a:latin typeface="Cambria Math" panose="02040503050406030204" pitchFamily="18" charset="0"/>
-                          </a:rPr>
-                          <m:t>+</m:t>
-                        </m:r>
-                        <m:sSup>
-                          <m:sSupPr>
-                            <m:ctrlPr>
-                              <a:rPr lang="en-US" i="1">
-                                <a:latin typeface="Cambria Math" panose="02040503050406030204" pitchFamily="18" charset="0"/>
-                              </a:rPr>
-                            </m:ctrlPr>
-                          </m:sSupPr>
-                          <m:e>
-                            <m:r>
-                              <a:rPr lang="en-US" i="1">
-                                <a:latin typeface="Cambria Math" panose="02040503050406030204" pitchFamily="18" charset="0"/>
-                              </a:rPr>
-                              <m:t>𝑊</m:t>
-                            </m:r>
-                          </m:e>
-                          <m:sup>
-                            <m:r>
-                              <a:rPr lang="en-US" i="1">
-                                <a:latin typeface="Cambria Math" panose="02040503050406030204" pitchFamily="18" charset="0"/>
-                              </a:rPr>
-                              <m:t>𝑟𝑒𝑐</m:t>
-                            </m:r>
-                          </m:sup>
-                        </m:sSup>
-                        <m:r>
-                          <a:rPr lang="en-US" b="0" i="1" smtClean="0">
-                            <a:latin typeface="Cambria Math" panose="02040503050406030204" pitchFamily="18" charset="0"/>
-                          </a:rPr>
-                          <m:t>∗</m:t>
-                        </m:r>
-                        <m:sSub>
-                          <m:sSubPr>
-                            <m:ctrlPr>
-                              <a:rPr lang="en-US" i="1">
-                                <a:latin typeface="Cambria Math" panose="02040503050406030204" pitchFamily="18" charset="0"/>
-                              </a:rPr>
-                            </m:ctrlPr>
-                          </m:sSubPr>
-                          <m:e>
-                            <m:r>
-                              <a:rPr lang="en-US" b="0" i="1" smtClean="0">
-                                <a:latin typeface="Cambria Math" panose="02040503050406030204" pitchFamily="18" charset="0"/>
-                              </a:rPr>
-                              <m:t>𝑢</m:t>
-                            </m:r>
-                          </m:e>
-                          <m:sub>
-                            <m:r>
-                              <a:rPr lang="en-US" i="1">
-                                <a:latin typeface="Cambria Math" panose="02040503050406030204" pitchFamily="18" charset="0"/>
-                              </a:rPr>
-                              <m:t>𝑡</m:t>
-                            </m:r>
-                          </m:sub>
-                        </m:sSub>
-                        <m:r>
-                          <a:rPr lang="en-US" b="0" i="1" smtClean="0">
-                            <a:latin typeface="Cambria Math" panose="02040503050406030204" pitchFamily="18" charset="0"/>
-                          </a:rPr>
-                          <m:t>+</m:t>
-                        </m:r>
-                        <m:sSub>
-                          <m:sSubPr>
-                            <m:ctrlPr>
-                              <a:rPr lang="en-US" i="1">
-                                <a:latin typeface="Cambria Math" panose="02040503050406030204" pitchFamily="18" charset="0"/>
-                              </a:rPr>
-                            </m:ctrlPr>
-                          </m:sSubPr>
-                          <m:e>
-                            <m:r>
-                              <a:rPr lang="en-US" b="0" i="1" smtClean="0">
-                                <a:latin typeface="Cambria Math" panose="02040503050406030204" pitchFamily="18" charset="0"/>
-                              </a:rPr>
-                              <m:t>𝑏</m:t>
-                            </m:r>
-                          </m:e>
-                          <m:sub>
-                            <m:r>
-                              <a:rPr lang="en-US" b="0" i="1" smtClean="0">
-                                <a:latin typeface="Cambria Math" panose="02040503050406030204" pitchFamily="18" charset="0"/>
-                              </a:rPr>
-                              <m:t>𝑟𝑒𝑐</m:t>
-                            </m:r>
-                          </m:sub>
-                        </m:sSub>
-                      </m:e>
-                    </m:d>
-                    <m:r>
-                      <a:rPr lang="en-US" b="0" i="1" smtClean="0">
-                        <a:latin typeface="Cambria Math" panose="02040503050406030204" pitchFamily="18" charset="0"/>
-                      </a:rPr>
-                      <m:t>+</m:t>
-                    </m:r>
-                    <m:rad>
-                      <m:radPr>
-                        <m:degHide m:val="on"/>
-                        <m:ctrlPr>
-                          <a:rPr lang="en-US" b="0" i="1" smtClean="0">
-                            <a:latin typeface="Cambria Math" panose="02040503050406030204" pitchFamily="18" charset="0"/>
-                          </a:rPr>
-                        </m:ctrlPr>
-                      </m:radPr>
-                      <m:deg/>
-                      <m:e>
-                        <m:r>
-                          <a:rPr lang="en-US" b="0" i="1" smtClean="0">
-                            <a:latin typeface="Cambria Math" panose="02040503050406030204" pitchFamily="18" charset="0"/>
-                          </a:rPr>
-                          <m:t>2∗</m:t>
-                        </m:r>
-                        <m:r>
-                          <m:rPr>
-                            <m:sty m:val="p"/>
-                          </m:rPr>
-                          <a:rPr lang="el-GR" i="1">
-                            <a:latin typeface="Cambria Math" panose="02040503050406030204" pitchFamily="18" charset="0"/>
-                          </a:rPr>
-                          <m:t>α</m:t>
-                        </m:r>
-                        <m:r>
-                          <a:rPr lang="en-US" b="0" i="1" smtClean="0">
-                            <a:latin typeface="Cambria Math" panose="02040503050406030204" pitchFamily="18" charset="0"/>
-                          </a:rPr>
-                          <m:t>∗</m:t>
-                        </m:r>
-                        <m:sSubSup>
-                          <m:sSubSupPr>
-                            <m:ctrlPr>
-                              <a:rPr lang="en-US" i="1" smtClean="0">
-                                <a:latin typeface="Cambria Math" panose="02040503050406030204" pitchFamily="18" charset="0"/>
-                              </a:rPr>
-                            </m:ctrlPr>
-                          </m:sSubSupPr>
-                          <m:e>
-                            <m:r>
-                              <a:rPr lang="en-US" b="0" i="1" smtClean="0">
-                                <a:latin typeface="Cambria Math" panose="02040503050406030204" pitchFamily="18" charset="0"/>
-                              </a:rPr>
-                              <m:t>𝑁</m:t>
-                            </m:r>
-                          </m:e>
-                          <m:sub>
-                            <m:r>
-                              <a:rPr lang="en-US" b="0" i="1" smtClean="0">
-                                <a:latin typeface="Cambria Math" panose="02040503050406030204" pitchFamily="18" charset="0"/>
-                              </a:rPr>
-                              <m:t>𝑟𝑒𝑐</m:t>
-                            </m:r>
-                          </m:sub>
-                          <m:sup>
-                            <m:r>
-                              <a:rPr lang="en-US" b="0" i="1" smtClean="0">
-                                <a:latin typeface="Cambria Math" panose="02040503050406030204" pitchFamily="18" charset="0"/>
-                              </a:rPr>
-                              <m:t>2</m:t>
-                            </m:r>
-                          </m:sup>
-                        </m:sSubSup>
-                      </m:e>
-                    </m:rad>
-                    <m:r>
-                      <a:rPr lang="en-US" b="0" i="1" smtClean="0">
-                        <a:latin typeface="Cambria Math" panose="02040503050406030204" pitchFamily="18" charset="0"/>
-                      </a:rPr>
-                      <m:t>+</m:t>
-                    </m:r>
-                    <m:r>
-                      <a:rPr lang="en-US" b="0" i="1" smtClean="0">
-                        <a:latin typeface="Cambria Math" panose="02040503050406030204" pitchFamily="18" charset="0"/>
-                      </a:rPr>
-                      <m:t>𝑁</m:t>
-                    </m:r>
-                    <m:r>
-                      <a:rPr lang="en-US" b="0" i="1" smtClean="0">
-                        <a:latin typeface="Cambria Math" panose="02040503050406030204" pitchFamily="18" charset="0"/>
-                      </a:rPr>
-                      <m:t>(0,1)</m:t>
-                    </m:r>
-                  </m:oMath>
-                </a14:m>
-                <a:endParaRPr lang="en-US" b="0" dirty="0"/>
-              </a:p>
-              <a:p>
-                <a:pPr marL="0" indent="0">
-                  <a:buNone/>
-                </a:pPr>
-                <a:endParaRPr lang="en-US" b="0" dirty="0"/>
-              </a:p>
-              <a:p>
-                <a14:m>
-                  <m:oMath xmlns:m="http://schemas.openxmlformats.org/officeDocument/2006/math">
-                    <m:sSub>
-                      <m:sSubPr>
-                        <m:ctrlPr>
-                          <a:rPr lang="en-US" i="1">
-                            <a:latin typeface="Cambria Math" panose="02040503050406030204" pitchFamily="18" charset="0"/>
-                          </a:rPr>
-                        </m:ctrlPr>
-                      </m:sSubPr>
-                      <m:e>
-                        <m:r>
-                          <a:rPr lang="en-US" b="0" i="1" smtClean="0">
-                            <a:latin typeface="Cambria Math" panose="02040503050406030204" pitchFamily="18" charset="0"/>
-                          </a:rPr>
-                          <m:t>𝑦</m:t>
-                        </m:r>
-                      </m:e>
-                      <m:sub>
-                        <m:r>
-                          <a:rPr lang="en-US" i="1">
-                            <a:latin typeface="Cambria Math" panose="02040503050406030204" pitchFamily="18" charset="0"/>
-                          </a:rPr>
-                          <m:t>𝑡</m:t>
-                        </m:r>
-                        <m:r>
-                          <a:rPr lang="en-US" b="0" i="1" smtClean="0">
-                            <a:latin typeface="Cambria Math" panose="02040503050406030204" pitchFamily="18" charset="0"/>
-                          </a:rPr>
-                          <m:t>+1</m:t>
-                        </m:r>
-                      </m:sub>
-                    </m:sSub>
-                    <m:r>
-                      <a:rPr lang="en-US" i="1">
-                        <a:latin typeface="Cambria Math" panose="02040503050406030204" pitchFamily="18" charset="0"/>
-                      </a:rPr>
-                      <m:t>=</m:t>
-                    </m:r>
-                    <m:r>
-                      <m:rPr>
-                        <m:nor/>
-                      </m:rPr>
-                      <a:rPr lang="en-US" dirty="0"/>
-                      <m:t> </m:t>
-                    </m:r>
-                    <m:d>
-                      <m:dPr>
-                        <m:ctrlPr>
-                          <a:rPr lang="en-US" i="1">
-                            <a:latin typeface="Cambria Math" panose="02040503050406030204" pitchFamily="18" charset="0"/>
-                          </a:rPr>
-                        </m:ctrlPr>
-                      </m:dPr>
-                      <m:e>
-                        <m:sSup>
-                          <m:sSupPr>
-                            <m:ctrlPr>
-                              <a:rPr lang="en-US" i="1">
-                                <a:latin typeface="Cambria Math" panose="02040503050406030204" pitchFamily="18" charset="0"/>
-                              </a:rPr>
-                            </m:ctrlPr>
-                          </m:sSupPr>
-                          <m:e>
-                            <m:r>
-                              <a:rPr lang="en-US" i="1">
-                                <a:latin typeface="Cambria Math" panose="02040503050406030204" pitchFamily="18" charset="0"/>
-                              </a:rPr>
-                              <m:t>𝑊</m:t>
-                            </m:r>
-                          </m:e>
-                          <m:sup>
-                            <m:r>
-                              <a:rPr lang="en-US" b="0" i="1" smtClean="0">
-                                <a:latin typeface="Cambria Math" panose="02040503050406030204" pitchFamily="18" charset="0"/>
-                              </a:rPr>
-                              <m:t>𝑜𝑢𝑡</m:t>
-                            </m:r>
-                          </m:sup>
-                        </m:sSup>
-                        <m:r>
-                          <a:rPr lang="en-US" i="1">
-                            <a:latin typeface="Cambria Math" panose="02040503050406030204" pitchFamily="18" charset="0"/>
-                          </a:rPr>
-                          <m:t>∗</m:t>
-                        </m:r>
-                        <m:r>
-                          <a:rPr lang="en-US" i="1">
-                            <a:latin typeface="Cambria Math" panose="02040503050406030204" pitchFamily="18" charset="0"/>
-                          </a:rPr>
-                          <m:t>𝑟𝑒𝑙𝑢</m:t>
-                        </m:r>
-                        <m:d>
-                          <m:dPr>
-                            <m:ctrlPr>
-                              <a:rPr lang="en-US" i="1">
-                                <a:latin typeface="Cambria Math" panose="02040503050406030204" pitchFamily="18" charset="0"/>
-                              </a:rPr>
-                            </m:ctrlPr>
-                          </m:dPr>
-                          <m:e>
-                            <m:sSub>
-                              <m:sSubPr>
-                                <m:ctrlPr>
-                                  <a:rPr lang="en-US" i="1">
-                                    <a:latin typeface="Cambria Math" panose="02040503050406030204" pitchFamily="18" charset="0"/>
-                                  </a:rPr>
-                                </m:ctrlPr>
-                              </m:sSubPr>
-                              <m:e>
-                                <m:r>
-                                  <a:rPr lang="en-US" i="1">
-                                    <a:latin typeface="Cambria Math" panose="02040503050406030204" pitchFamily="18" charset="0"/>
-                                  </a:rPr>
-                                  <m:t>𝑥</m:t>
-                                </m:r>
-                              </m:e>
-                              <m:sub>
-                                <m:r>
-                                  <a:rPr lang="en-US" i="1">
-                                    <a:latin typeface="Cambria Math" panose="02040503050406030204" pitchFamily="18" charset="0"/>
-                                  </a:rPr>
-                                  <m:t>𝑡</m:t>
-                                </m:r>
-                                <m:r>
-                                  <a:rPr lang="en-US" b="0" i="1" smtClean="0">
-                                    <a:latin typeface="Cambria Math" panose="02040503050406030204" pitchFamily="18" charset="0"/>
-                                  </a:rPr>
-                                  <m:t>+1</m:t>
-                                </m:r>
-                              </m:sub>
-                            </m:sSub>
-                          </m:e>
-                        </m:d>
-                        <m:r>
-                          <a:rPr lang="en-US" i="1">
-                            <a:latin typeface="Cambria Math" panose="02040503050406030204" pitchFamily="18" charset="0"/>
-                          </a:rPr>
-                          <m:t>+</m:t>
-                        </m:r>
-                        <m:sSub>
-                          <m:sSubPr>
-                            <m:ctrlPr>
-                              <a:rPr lang="en-US" i="1">
-                                <a:latin typeface="Cambria Math" panose="02040503050406030204" pitchFamily="18" charset="0"/>
-                              </a:rPr>
-                            </m:ctrlPr>
-                          </m:sSubPr>
-                          <m:e>
-                            <m:r>
-                              <a:rPr lang="en-US" i="1">
-                                <a:latin typeface="Cambria Math" panose="02040503050406030204" pitchFamily="18" charset="0"/>
-                              </a:rPr>
-                              <m:t>𝑏</m:t>
-                            </m:r>
-                          </m:e>
-                          <m:sub>
-                            <m:r>
-                              <a:rPr lang="en-US" b="0" i="1" smtClean="0">
-                                <a:latin typeface="Cambria Math" panose="02040503050406030204" pitchFamily="18" charset="0"/>
-                              </a:rPr>
-                              <m:t>𝑜𝑢𝑡</m:t>
-                            </m:r>
-                          </m:sub>
-                        </m:sSub>
-                      </m:e>
-                    </m:d>
-                  </m:oMath>
-                </a14:m>
-                <a:endParaRPr lang="en-US" dirty="0"/>
-              </a:p>
-            </p:txBody>
-          </p:sp>
-        </mc:Choice>
-        <mc:Fallback xmlns="">
-          <p:sp>
-            <p:nvSpPr>
-              <p:cNvPr id="3" name="Content Placeholder 2">
-                <a:extLst>
-                  <a:ext uri="{FF2B5EF4-FFF2-40B4-BE49-F238E27FC236}">
-                    <a16:creationId xmlns:a16="http://schemas.microsoft.com/office/drawing/2014/main" id="{7F9BF9D3-0A5C-4893-8395-03C903430E93}"/>
-                  </a:ext>
-                </a:extLst>
-              </p:cNvPr>
-              <p:cNvSpPr>
-                <a:spLocks noGrp="1" noRot="1" noChangeAspect="1" noMove="1" noResize="1" noEditPoints="1" noAdjustHandles="1" noChangeArrowheads="1" noChangeShapeType="1" noTextEdit="1"/>
-              </p:cNvSpPr>
-              <p:nvPr>
-                <p:ph idx="1"/>
-              </p:nvPr>
-            </p:nvSpPr>
-            <p:spPr>
-              <a:blipFill>
-                <a:blip r:embed="rId2"/>
-                <a:stretch>
-                  <a:fillRect/>
-                </a:stretch>
-              </a:blipFill>
-            </p:spPr>
-            <p:txBody>
-              <a:bodyPr/>
-              <a:lstStyle/>
-              <a:p>
-                <a:r>
-                  <a:rPr lang="en-US">
-                    <a:noFill/>
-                  </a:rPr>
-                  <a:t> </a:t>
-                </a:r>
-              </a:p>
-            </p:txBody>
-          </p:sp>
-        </mc:Fallback>
-      </mc:AlternateContent>
-      <p:sp>
-        <p:nvSpPr>
-          <p:cNvPr id="4" name="Rectangle 1">
-            <a:extLst>
-              <a:ext uri="{FF2B5EF4-FFF2-40B4-BE49-F238E27FC236}">
-                <a16:creationId xmlns:a16="http://schemas.microsoft.com/office/drawing/2014/main" id="{55588CFC-EB20-4D86-96AB-D0D923E3C805}"/>
-              </a:ext>
-            </a:extLst>
-          </p:cNvPr>
-          <p:cNvSpPr>
-            <a:spLocks noChangeArrowheads="1"/>
-          </p:cNvSpPr>
-          <p:nvPr/>
-        </p:nvSpPr>
-        <p:spPr bwMode="auto">
-          <a:xfrm>
-            <a:off x="0" y="0"/>
-            <a:ext cx="12192000" cy="457200"/>
-          </a:xfrm>
-          <a:prstGeom prst="rect">
-            <a:avLst/>
-          </a:prstGeom>
-          <a:noFill/>
-          <a:ln>
-            <a:noFill/>
-          </a:ln>
-          <a:effectLst/>
-          <a:extLst>
-            <a:ext uri="{909E8E84-426E-40DD-AFC4-6F175D3DCCD1}">
-              <a14:hiddenFill xmlns:a14="http://schemas.microsoft.com/office/drawing/2010/main">
-                <a:solidFill>
-                  <a:schemeClr val="accent1"/>
-                </a:solidFill>
-              </a14:hiddenFill>
-            </a:ext>
-            <a:ext uri="{91240B29-F687-4F45-9708-019B960494DF}">
-              <a14:hiddenLine xmlns:a14="http://schemas.microsoft.com/office/drawing/2010/main" w="9525">
-                <a:solidFill>
-                  <a:schemeClr val="tx1"/>
-                </a:solidFill>
-                <a:miter lim="800000"/>
-                <a:headEnd/>
-                <a:tailEnd/>
-              </a14:hiddenLine>
-            </a:ext>
-            <a:ext uri="{AF507438-7753-43E0-B8FC-AC1667EBCBE1}">
-              <a14:hiddenEffects xmlns:a14="http://schemas.microsoft.com/office/drawing/2010/main">
-                <a:effectLst>
-                  <a:outerShdw dist="35921" dir="2700000" algn="ctr" rotWithShape="0">
-                    <a:schemeClr val="bg2"/>
-                  </a:outerShdw>
-                </a:effectLst>
-              </a14:hiddenEffects>
-            </a:ext>
-          </a:extLst>
-        </p:spPr>
-        <p:txBody>
-          <a:bodyPr vert="horz" wrap="none" lIns="0" tIns="0" rIns="0" bIns="0" numCol="1" anchor="ctr" anchorCtr="0" compatLnSpc="1">
-            <a:prstTxWarp prst="textNoShape">
-              <a:avLst/>
-            </a:prstTxWarp>
-            <a:spAutoFit/>
-          </a:bodyPr>
-          <a:lstStyle/>
-          <a:p>
-            <a:pPr marL="0" marR="0" lvl="0" indent="0" algn="l" defTabSz="914400" rtl="0" eaLnBrk="0" fontAlgn="base" latinLnBrk="0" hangingPunct="0">
-              <a:lnSpc>
-                <a:spcPct val="100000"/>
-              </a:lnSpc>
-              <a:spcBef>
-                <a:spcPct val="0"/>
-              </a:spcBef>
-              <a:spcAft>
-                <a:spcPct val="0"/>
-              </a:spcAft>
-              <a:buClrTx/>
-              <a:buSzTx/>
-              <a:buFontTx/>
-              <a:buNone/>
-              <a:tabLst/>
-            </a:pPr>
-            <a:r>
-              <a:rPr kumimoji="0" lang="en-US" altLang="en-US" sz="900" b="0" i="0" u="none" strike="noStrike" cap="none" normalizeH="0" baseline="0">
-                <a:ln>
-                  <a:noFill/>
-                </a:ln>
-                <a:solidFill>
-                  <a:schemeClr val="tx1"/>
-                </a:solidFill>
-                <a:effectLst/>
-                <a:latin typeface="Arial Unicode MS"/>
-                <a:ea typeface="inherit"/>
-              </a:rPr>
-              <a:t>figsize=(8, 6)</a:t>
-            </a:r>
-            <a:r>
-              <a:rPr kumimoji="0" lang="en-US" altLang="en-US" sz="800" b="0" i="0" u="none" strike="noStrike" cap="none" normalizeH="0" baseline="0">
-                <a:ln>
-                  <a:noFill/>
-                </a:ln>
-                <a:solidFill>
-                  <a:schemeClr val="tx1"/>
-                </a:solidFill>
-                <a:effectLst/>
-              </a:rPr>
-              <a:t> </a:t>
-            </a:r>
-            <a:endParaRPr kumimoji="0" lang="en-US" altLang="en-US" sz="1800" b="0" i="0" u="none" strike="noStrike" cap="none" normalizeH="0" baseline="0">
-              <a:ln>
-                <a:noFill/>
-              </a:ln>
-              <a:solidFill>
-                <a:schemeClr val="tx1"/>
-              </a:solidFill>
-              <a:effectLst/>
-              <a:latin typeface="Arial" panose="020B0604020202020204" pitchFamily="34" charset="0"/>
-            </a:endParaRPr>
-          </a:p>
-        </p:txBody>
-      </p:sp>
-      <p:sp>
-        <p:nvSpPr>
-          <p:cNvPr id="5" name="Rectangle 1">
-            <a:extLst>
-              <a:ext uri="{FF2B5EF4-FFF2-40B4-BE49-F238E27FC236}">
-                <a16:creationId xmlns:a16="http://schemas.microsoft.com/office/drawing/2014/main" id="{12452F51-75D1-4BF7-A190-00989342FF2B}"/>
-              </a:ext>
-            </a:extLst>
-          </p:cNvPr>
-          <p:cNvSpPr>
-            <a:spLocks noChangeArrowheads="1"/>
-          </p:cNvSpPr>
-          <p:nvPr/>
-        </p:nvSpPr>
-        <p:spPr bwMode="auto">
-          <a:xfrm>
-            <a:off x="152400" y="152400"/>
-            <a:ext cx="12192000" cy="457200"/>
-          </a:xfrm>
-          <a:prstGeom prst="rect">
-            <a:avLst/>
-          </a:prstGeom>
-          <a:noFill/>
-          <a:ln>
-            <a:noFill/>
-          </a:ln>
-          <a:effectLst/>
-          <a:extLst>
-            <a:ext uri="{909E8E84-426E-40DD-AFC4-6F175D3DCCD1}">
-              <a14:hiddenFill xmlns:a14="http://schemas.microsoft.com/office/drawing/2010/main">
-                <a:solidFill>
-                  <a:schemeClr val="accent1"/>
-                </a:solidFill>
-              </a14:hiddenFill>
-            </a:ext>
-            <a:ext uri="{91240B29-F687-4F45-9708-019B960494DF}">
-              <a14:hiddenLine xmlns:a14="http://schemas.microsoft.com/office/drawing/2010/main" w="9525">
-                <a:solidFill>
-                  <a:schemeClr val="tx1"/>
-                </a:solidFill>
-                <a:miter lim="800000"/>
-                <a:headEnd/>
-                <a:tailEnd/>
-              </a14:hiddenLine>
-            </a:ext>
-            <a:ext uri="{AF507438-7753-43E0-B8FC-AC1667EBCBE1}">
-              <a14:hiddenEffects xmlns:a14="http://schemas.microsoft.com/office/drawing/2010/main">
-                <a:effectLst>
-                  <a:outerShdw dist="35921" dir="2700000" algn="ctr" rotWithShape="0">
-                    <a:schemeClr val="bg2"/>
-                  </a:outerShdw>
-                </a:effectLst>
-              </a14:hiddenEffects>
-            </a:ext>
-          </a:extLst>
-        </p:spPr>
-        <p:txBody>
-          <a:bodyPr vert="horz" wrap="none" lIns="0" tIns="0" rIns="0" bIns="0" numCol="1" anchor="ctr" anchorCtr="0" compatLnSpc="1">
-            <a:prstTxWarp prst="textNoShape">
-              <a:avLst/>
-            </a:prstTxWarp>
-            <a:spAutoFit/>
-          </a:bodyPr>
-          <a:lstStyle/>
-          <a:p>
-            <a:pPr marL="0" marR="0" lvl="0" indent="0" algn="l" defTabSz="914400" rtl="0" eaLnBrk="0" fontAlgn="base" latinLnBrk="0" hangingPunct="0">
-              <a:lnSpc>
-                <a:spcPct val="100000"/>
-              </a:lnSpc>
-              <a:spcBef>
-                <a:spcPct val="0"/>
-              </a:spcBef>
-              <a:spcAft>
-                <a:spcPct val="0"/>
-              </a:spcAft>
-              <a:buClrTx/>
-              <a:buSzTx/>
-              <a:buFontTx/>
-              <a:buNone/>
-              <a:tabLst/>
-            </a:pPr>
-            <a:r>
-              <a:rPr kumimoji="0" lang="en-US" altLang="en-US" sz="900" b="0" i="0" u="none" strike="noStrike" cap="none" normalizeH="0" baseline="0">
-                <a:ln>
-                  <a:noFill/>
-                </a:ln>
-                <a:solidFill>
-                  <a:schemeClr val="tx1"/>
-                </a:solidFill>
-                <a:effectLst/>
-                <a:latin typeface="Arial Unicode MS"/>
-                <a:ea typeface="inherit"/>
-              </a:rPr>
-              <a:t>figsize=(8, 6)</a:t>
-            </a:r>
-            <a:r>
-              <a:rPr kumimoji="0" lang="en-US" altLang="en-US" sz="800" b="0" i="0" u="none" strike="noStrike" cap="none" normalizeH="0" baseline="0">
-                <a:ln>
-                  <a:noFill/>
-                </a:ln>
-                <a:solidFill>
-                  <a:schemeClr val="tx1"/>
-                </a:solidFill>
-                <a:effectLst/>
-              </a:rPr>
-              <a:t> </a:t>
-            </a:r>
-            <a:endParaRPr kumimoji="0" lang="en-US" altLang="en-US" sz="1800" b="0" i="0" u="none" strike="noStrike" cap="none" normalizeH="0" baseline="0">
-              <a:ln>
-                <a:noFill/>
-              </a:ln>
-              <a:solidFill>
-                <a:schemeClr val="tx1"/>
-              </a:solidFill>
-              <a:effectLst/>
-              <a:latin typeface="Arial" panose="020B0604020202020204" pitchFamily="34" charset="0"/>
-            </a:endParaRPr>
-          </a:p>
-        </p:txBody>
-      </p:sp>
-    </p:spTree>
-    <p:extLst>
-      <p:ext uri="{BB962C8B-B14F-4D97-AF65-F5344CB8AC3E}">
-        <p14:creationId xmlns:p14="http://schemas.microsoft.com/office/powerpoint/2010/main" val="83453457"/>
       </p:ext>
     </p:extLst>
   </p:cSld>
@@ -24025,7 +25462,7 @@
           <a:p>
             <a:r>
               <a:rPr lang="en-US" dirty="0"/>
-              <a:t>Gain2/basic2 model</a:t>
+              <a:t>Week1: Gain2/basic2 model</a:t>
             </a:r>
           </a:p>
         </p:txBody>

</xml_diff>